<commit_message>
Added material to 50_React
</commit_message>
<xml_diff>
--- a/50_React/React.pptx
+++ b/50_React/React.pptx
@@ -39,6 +39,17 @@
     <p:sldId id="358" r:id="rId33"/>
     <p:sldId id="359" r:id="rId34"/>
     <p:sldId id="360" r:id="rId35"/>
+    <p:sldId id="361" r:id="rId36"/>
+    <p:sldId id="363" r:id="rId37"/>
+    <p:sldId id="362" r:id="rId38"/>
+    <p:sldId id="364" r:id="rId39"/>
+    <p:sldId id="366" r:id="rId40"/>
+    <p:sldId id="370" r:id="rId41"/>
+    <p:sldId id="365" r:id="rId42"/>
+    <p:sldId id="367" r:id="rId43"/>
+    <p:sldId id="368" r:id="rId44"/>
+    <p:sldId id="369" r:id="rId45"/>
+    <p:sldId id="371" r:id="rId46"/>
   </p:sldIdLst>
   <p:sldSz cx="12192000" cy="6858000"/>
   <p:notesSz cx="6858000" cy="9144000"/>
@@ -14388,30 +14399,44 @@
           <a:p>
             <a:r>
               <a:rPr lang="da-DK" sz="3200" smtClean="0"/>
-              <a:t>Rules for class-based components:</a:t>
+              <a:t>Advantages </a:t>
+            </a:r>
+            <a:r>
+              <a:rPr lang="da-DK" sz="3200" smtClean="0"/>
+              <a:t>for class-based components:</a:t>
             </a:r>
           </a:p>
           <a:p>
             <a:pPr lvl="1"/>
             <a:r>
               <a:rPr lang="da-DK" sz="2800" smtClean="0"/>
-              <a:t>TBD</a:t>
-            </a:r>
+              <a:t>Better code organisation</a:t>
+            </a:r>
+            <a:endParaRPr lang="da-DK" sz="2800" smtClean="0"/>
           </a:p>
           <a:p>
             <a:pPr lvl="1"/>
             <a:r>
               <a:rPr lang="da-DK" sz="2800" smtClean="0"/>
-              <a:t>TBD</a:t>
-            </a:r>
+              <a:t>Can make use of </a:t>
+            </a:r>
+            <a:r>
+              <a:rPr lang="da-DK" sz="2800" b="1" smtClean="0"/>
+              <a:t>state</a:t>
+            </a:r>
+            <a:endParaRPr lang="da-DK" sz="2800" b="1" smtClean="0"/>
           </a:p>
           <a:p>
             <a:pPr lvl="1"/>
             <a:r>
               <a:rPr lang="da-DK" sz="2800" smtClean="0"/>
-              <a:t>TBD</a:t>
-            </a:r>
-            <a:endParaRPr lang="da-DK" sz="2800"/>
+              <a:t>Make use of </a:t>
+            </a:r>
+            <a:r>
+              <a:rPr lang="da-DK" sz="2800" b="1" smtClean="0"/>
+              <a:t>lifecycle events</a:t>
+            </a:r>
+            <a:endParaRPr lang="da-DK" sz="2800" b="1"/>
           </a:p>
         </p:txBody>
       </p:sp>
@@ -14460,6 +14485,2397 @@
     <p:extLst>
       <p:ext uri="{BB962C8B-B14F-4D97-AF65-F5344CB8AC3E}">
         <p14:creationId xmlns:p14="http://schemas.microsoft.com/office/powerpoint/2010/main" val="3060019563"/>
+      </p:ext>
+    </p:extLst>
+  </p:cSld>
+  <p:clrMapOvr>
+    <a:masterClrMapping/>
+  </p:clrMapOvr>
+  <p:timing>
+    <p:tnLst>
+      <p:par>
+        <p:cTn id="1" dur="indefinite" restart="never" nodeType="tmRoot"/>
+      </p:par>
+    </p:tnLst>
+  </p:timing>
+</p:sld>
+</file>
+
+<file path=ppt/slides/slide35.xml><?xml version="1.0" encoding="utf-8"?>
+<p:sld xmlns:a="http://schemas.openxmlformats.org/drawingml/2006/main" xmlns:r="http://schemas.openxmlformats.org/officeDocument/2006/relationships" xmlns:p="http://schemas.openxmlformats.org/presentationml/2006/main">
+  <p:cSld>
+    <p:spTree>
+      <p:nvGrpSpPr>
+        <p:cNvPr id="1" name=""/>
+        <p:cNvGrpSpPr/>
+        <p:nvPr/>
+      </p:nvGrpSpPr>
+      <p:grpSpPr>
+        <a:xfrm>
+          <a:off x="0" y="0"/>
+          <a:ext cx="0" cy="0"/>
+          <a:chOff x="0" y="0"/>
+          <a:chExt cx="0" cy="0"/>
+        </a:xfrm>
+      </p:grpSpPr>
+      <p:sp>
+        <p:nvSpPr>
+          <p:cNvPr id="2" name="Titel 1"/>
+          <p:cNvSpPr>
+            <a:spLocks noGrp="1"/>
+          </p:cNvSpPr>
+          <p:nvPr>
+            <p:ph type="title"/>
+          </p:nvPr>
+        </p:nvSpPr>
+        <p:spPr/>
+        <p:txBody>
+          <a:bodyPr/>
+          <a:lstStyle/>
+          <a:p>
+            <a:r>
+              <a:rPr lang="da-DK" b="1" smtClean="0"/>
+              <a:t>React – Components</a:t>
+            </a:r>
+            <a:endParaRPr lang="da-DK" b="1"/>
+          </a:p>
+        </p:txBody>
+      </p:sp>
+      <p:sp>
+        <p:nvSpPr>
+          <p:cNvPr id="3" name="Pladsholder til indhold 2"/>
+          <p:cNvSpPr>
+            <a:spLocks noGrp="1"/>
+          </p:cNvSpPr>
+          <p:nvPr>
+            <p:ph idx="1"/>
+          </p:nvPr>
+        </p:nvSpPr>
+        <p:spPr>
+          <a:xfrm>
+            <a:off x="838201" y="1825625"/>
+            <a:ext cx="7990702" cy="4351338"/>
+          </a:xfrm>
+        </p:spPr>
+        <p:txBody>
+          <a:bodyPr>
+            <a:normAutofit/>
+          </a:bodyPr>
+          <a:lstStyle/>
+          <a:p>
+            <a:r>
+              <a:rPr lang="da-DK" sz="3200" smtClean="0"/>
+              <a:t>Rules </a:t>
+            </a:r>
+            <a:r>
+              <a:rPr lang="da-DK" sz="3200" smtClean="0"/>
+              <a:t>for class-based components:</a:t>
+            </a:r>
+          </a:p>
+          <a:p>
+            <a:pPr lvl="1"/>
+            <a:r>
+              <a:rPr lang="da-DK" sz="2800"/>
+              <a:t>Must extend (inherit from) </a:t>
+            </a:r>
+            <a:r>
+              <a:rPr lang="da-DK" sz="2800" b="1" smtClean="0"/>
+              <a:t>React.Component</a:t>
+            </a:r>
+            <a:endParaRPr lang="da-DK" sz="2800" b="1" smtClean="0"/>
+          </a:p>
+          <a:p>
+            <a:pPr lvl="1"/>
+            <a:r>
+              <a:rPr lang="da-DK" sz="2800" smtClean="0"/>
+              <a:t>Must implement the </a:t>
+            </a:r>
+            <a:r>
+              <a:rPr lang="da-DK" sz="2800" b="1" smtClean="0"/>
+              <a:t>render</a:t>
+            </a:r>
+            <a:r>
+              <a:rPr lang="da-DK" sz="2800" smtClean="0"/>
+              <a:t> method</a:t>
+            </a:r>
+            <a:endParaRPr lang="da-DK" sz="2800" b="1" smtClean="0"/>
+          </a:p>
+          <a:p>
+            <a:pPr lvl="1"/>
+            <a:r>
+              <a:rPr lang="da-DK" sz="2800" smtClean="0"/>
+              <a:t>Will usually contain a constructor</a:t>
+            </a:r>
+            <a:endParaRPr lang="da-DK" sz="2800" b="1"/>
+          </a:p>
+        </p:txBody>
+      </p:sp>
+      <p:pic>
+        <p:nvPicPr>
+          <p:cNvPr id="1026" name="Picture 2" descr="Billedresultat for react logo"/>
+          <p:cNvPicPr>
+            <a:picLocks noChangeAspect="1" noChangeArrowheads="1"/>
+          </p:cNvPicPr>
+          <p:nvPr/>
+        </p:nvPicPr>
+        <p:blipFill>
+          <a:blip r:embed="rId2">
+            <a:extLst>
+              <a:ext uri="{28A0092B-C50C-407E-A947-70E740481C1C}">
+                <a14:useLocalDpi xmlns:a14="http://schemas.microsoft.com/office/drawing/2010/main" val="0"/>
+              </a:ext>
+            </a:extLst>
+          </a:blip>
+          <a:srcRect/>
+          <a:stretch>
+            <a:fillRect/>
+          </a:stretch>
+        </p:blipFill>
+        <p:spPr bwMode="auto">
+          <a:xfrm>
+            <a:off x="8180173" y="840312"/>
+            <a:ext cx="3761689" cy="2656694"/>
+          </a:xfrm>
+          <a:prstGeom prst="rect">
+            <a:avLst/>
+          </a:prstGeom>
+          <a:noFill/>
+          <a:extLst>
+            <a:ext uri="{909E8E84-426E-40DD-AFC4-6F175D3DCCD1}">
+              <a14:hiddenFill xmlns:a14="http://schemas.microsoft.com/office/drawing/2010/main">
+                <a:solidFill>
+                  <a:srgbClr val="FFFFFF"/>
+                </a:solidFill>
+              </a14:hiddenFill>
+            </a:ext>
+          </a:extLst>
+        </p:spPr>
+      </p:pic>
+    </p:spTree>
+    <p:extLst>
+      <p:ext uri="{BB962C8B-B14F-4D97-AF65-F5344CB8AC3E}">
+        <p14:creationId xmlns:p14="http://schemas.microsoft.com/office/powerpoint/2010/main" val="1321110486"/>
+      </p:ext>
+    </p:extLst>
+  </p:cSld>
+  <p:clrMapOvr>
+    <a:masterClrMapping/>
+  </p:clrMapOvr>
+  <p:timing>
+    <p:tnLst>
+      <p:par>
+        <p:cTn id="1" dur="indefinite" restart="never" nodeType="tmRoot"/>
+      </p:par>
+    </p:tnLst>
+  </p:timing>
+</p:sld>
+</file>
+
+<file path=ppt/slides/slide36.xml><?xml version="1.0" encoding="utf-8"?>
+<p:sld xmlns:a="http://schemas.openxmlformats.org/drawingml/2006/main" xmlns:r="http://schemas.openxmlformats.org/officeDocument/2006/relationships" xmlns:p="http://schemas.openxmlformats.org/presentationml/2006/main">
+  <p:cSld>
+    <p:spTree>
+      <p:nvGrpSpPr>
+        <p:cNvPr id="1" name=""/>
+        <p:cNvGrpSpPr/>
+        <p:nvPr/>
+      </p:nvGrpSpPr>
+      <p:grpSpPr>
+        <a:xfrm>
+          <a:off x="0" y="0"/>
+          <a:ext cx="0" cy="0"/>
+          <a:chOff x="0" y="0"/>
+          <a:chExt cx="0" cy="0"/>
+        </a:xfrm>
+      </p:grpSpPr>
+      <p:sp>
+        <p:nvSpPr>
+          <p:cNvPr id="2" name="Titel 1"/>
+          <p:cNvSpPr>
+            <a:spLocks noGrp="1"/>
+          </p:cNvSpPr>
+          <p:nvPr>
+            <p:ph type="title"/>
+          </p:nvPr>
+        </p:nvSpPr>
+        <p:spPr/>
+        <p:txBody>
+          <a:bodyPr/>
+          <a:lstStyle/>
+          <a:p>
+            <a:r>
+              <a:rPr lang="da-DK" b="1" smtClean="0"/>
+              <a:t>React – example</a:t>
+            </a:r>
+            <a:endParaRPr lang="da-DK" b="1"/>
+          </a:p>
+        </p:txBody>
+      </p:sp>
+      <p:sp>
+        <p:nvSpPr>
+          <p:cNvPr id="6" name="Tekstfelt 5"/>
+          <p:cNvSpPr txBox="1"/>
+          <p:nvPr/>
+        </p:nvSpPr>
+        <p:spPr>
+          <a:xfrm>
+            <a:off x="739345" y="1639201"/>
+            <a:ext cx="11104605" cy="3323987"/>
+          </a:xfrm>
+          <a:prstGeom prst="rect">
+            <a:avLst/>
+          </a:prstGeom>
+          <a:solidFill>
+            <a:schemeClr val="tx1"/>
+          </a:solidFill>
+        </p:spPr>
+        <p:txBody>
+          <a:bodyPr wrap="square" rtlCol="0">
+            <a:spAutoFit/>
+          </a:bodyPr>
+          <a:lstStyle/>
+          <a:p>
+            <a:pPr defTabSz="360000"/>
+            <a:r>
+              <a:rPr lang="da-DK" sz="1400" smtClean="0">
+                <a:solidFill>
+                  <a:srgbClr val="569CD6"/>
+                </a:solidFill>
+                <a:latin typeface="Consolas" panose="020B0609020204030204" pitchFamily="49" charset="0"/>
+              </a:rPr>
+              <a:t>class</a:t>
+            </a:r>
+            <a:r>
+              <a:rPr lang="da-DK" sz="1400" smtClean="0">
+                <a:solidFill>
+                  <a:srgbClr val="D4D4D4"/>
+                </a:solidFill>
+                <a:latin typeface="Consolas" panose="020B0609020204030204" pitchFamily="49" charset="0"/>
+              </a:rPr>
+              <a:t> </a:t>
+            </a:r>
+            <a:r>
+              <a:rPr lang="da-DK" sz="1400">
+                <a:solidFill>
+                  <a:srgbClr val="4EC9B0"/>
+                </a:solidFill>
+                <a:latin typeface="Consolas" panose="020B0609020204030204" pitchFamily="49" charset="0"/>
+              </a:rPr>
+              <a:t>DriverCard</a:t>
+            </a:r>
+            <a:r>
+              <a:rPr lang="da-DK" sz="1400">
+                <a:solidFill>
+                  <a:srgbClr val="D4D4D4"/>
+                </a:solidFill>
+                <a:latin typeface="Consolas" panose="020B0609020204030204" pitchFamily="49" charset="0"/>
+              </a:rPr>
+              <a:t> </a:t>
+            </a:r>
+            <a:r>
+              <a:rPr lang="da-DK" sz="1400">
+                <a:solidFill>
+                  <a:srgbClr val="569CD6"/>
+                </a:solidFill>
+                <a:latin typeface="Consolas" panose="020B0609020204030204" pitchFamily="49" charset="0"/>
+              </a:rPr>
+              <a:t>extends</a:t>
+            </a:r>
+            <a:r>
+              <a:rPr lang="da-DK" sz="1400">
+                <a:solidFill>
+                  <a:srgbClr val="D4D4D4"/>
+                </a:solidFill>
+                <a:latin typeface="Consolas" panose="020B0609020204030204" pitchFamily="49" charset="0"/>
+              </a:rPr>
+              <a:t> </a:t>
+            </a:r>
+            <a:r>
+              <a:rPr lang="da-DK" sz="1400">
+                <a:solidFill>
+                  <a:srgbClr val="4EC9B0"/>
+                </a:solidFill>
+                <a:latin typeface="Consolas" panose="020B0609020204030204" pitchFamily="49" charset="0"/>
+              </a:rPr>
+              <a:t>React</a:t>
+            </a:r>
+            <a:r>
+              <a:rPr lang="da-DK" sz="1400">
+                <a:solidFill>
+                  <a:srgbClr val="D4D4D4"/>
+                </a:solidFill>
+                <a:latin typeface="Consolas" panose="020B0609020204030204" pitchFamily="49" charset="0"/>
+              </a:rPr>
+              <a:t>.</a:t>
+            </a:r>
+            <a:r>
+              <a:rPr lang="da-DK" sz="1400">
+                <a:solidFill>
+                  <a:srgbClr val="4EC9B0"/>
+                </a:solidFill>
+                <a:latin typeface="Consolas" panose="020B0609020204030204" pitchFamily="49" charset="0"/>
+              </a:rPr>
+              <a:t>Component</a:t>
+            </a:r>
+            <a:r>
+              <a:rPr lang="da-DK" sz="1400">
+                <a:solidFill>
+                  <a:srgbClr val="D4D4D4"/>
+                </a:solidFill>
+                <a:latin typeface="Consolas" panose="020B0609020204030204" pitchFamily="49" charset="0"/>
+              </a:rPr>
+              <a:t> {</a:t>
+            </a:r>
+          </a:p>
+          <a:p>
+            <a:pPr defTabSz="360000"/>
+            <a:r>
+              <a:rPr lang="da-DK" sz="1400" smtClean="0">
+                <a:solidFill>
+                  <a:srgbClr val="569CD6"/>
+                </a:solidFill>
+                <a:latin typeface="Consolas" panose="020B0609020204030204" pitchFamily="49" charset="0"/>
+              </a:rPr>
+              <a:t>	constructor</a:t>
+            </a:r>
+            <a:r>
+              <a:rPr lang="da-DK" sz="1400" smtClean="0">
+                <a:solidFill>
+                  <a:srgbClr val="D4D4D4"/>
+                </a:solidFill>
+                <a:latin typeface="Consolas" panose="020B0609020204030204" pitchFamily="49" charset="0"/>
+              </a:rPr>
+              <a:t>(</a:t>
+            </a:r>
+            <a:r>
+              <a:rPr lang="da-DK" sz="1400" smtClean="0">
+                <a:solidFill>
+                  <a:srgbClr val="9CDCFE"/>
+                </a:solidFill>
+                <a:latin typeface="Consolas" panose="020B0609020204030204" pitchFamily="49" charset="0"/>
+              </a:rPr>
+              <a:t>props</a:t>
+            </a:r>
+            <a:r>
+              <a:rPr lang="da-DK" sz="1400">
+                <a:solidFill>
+                  <a:srgbClr val="D4D4D4"/>
+                </a:solidFill>
+                <a:latin typeface="Consolas" panose="020B0609020204030204" pitchFamily="49" charset="0"/>
+              </a:rPr>
+              <a:t>) {</a:t>
+            </a:r>
+          </a:p>
+          <a:p>
+            <a:pPr defTabSz="360000"/>
+            <a:r>
+              <a:rPr lang="da-DK" sz="1400" smtClean="0">
+                <a:solidFill>
+                  <a:srgbClr val="569CD6"/>
+                </a:solidFill>
+                <a:latin typeface="Consolas" panose="020B0609020204030204" pitchFamily="49" charset="0"/>
+              </a:rPr>
+              <a:t>		super</a:t>
+            </a:r>
+            <a:r>
+              <a:rPr lang="da-DK" sz="1400" smtClean="0">
+                <a:solidFill>
+                  <a:srgbClr val="D4D4D4"/>
+                </a:solidFill>
+                <a:latin typeface="Consolas" panose="020B0609020204030204" pitchFamily="49" charset="0"/>
+              </a:rPr>
+              <a:t>(</a:t>
+            </a:r>
+            <a:r>
+              <a:rPr lang="da-DK" sz="1400" smtClean="0">
+                <a:solidFill>
+                  <a:srgbClr val="9CDCFE"/>
+                </a:solidFill>
+                <a:latin typeface="Consolas" panose="020B0609020204030204" pitchFamily="49" charset="0"/>
+              </a:rPr>
+              <a:t>props</a:t>
+            </a:r>
+            <a:r>
+              <a:rPr lang="da-DK" sz="1400">
+                <a:solidFill>
+                  <a:srgbClr val="D4D4D4"/>
+                </a:solidFill>
+                <a:latin typeface="Consolas" panose="020B0609020204030204" pitchFamily="49" charset="0"/>
+              </a:rPr>
+              <a:t>);</a:t>
+            </a:r>
+          </a:p>
+          <a:p>
+            <a:pPr defTabSz="360000"/>
+            <a:r>
+              <a:rPr lang="da-DK" sz="1400" smtClean="0">
+                <a:solidFill>
+                  <a:srgbClr val="569CD6"/>
+                </a:solidFill>
+                <a:latin typeface="Consolas" panose="020B0609020204030204" pitchFamily="49" charset="0"/>
+              </a:rPr>
+              <a:t>		this</a:t>
+            </a:r>
+            <a:r>
+              <a:rPr lang="da-DK" sz="1400" smtClean="0">
+                <a:solidFill>
+                  <a:srgbClr val="D4D4D4"/>
+                </a:solidFill>
+                <a:latin typeface="Consolas" panose="020B0609020204030204" pitchFamily="49" charset="0"/>
+              </a:rPr>
+              <a:t>.</a:t>
+            </a:r>
+            <a:r>
+              <a:rPr lang="da-DK" sz="1400" smtClean="0">
+                <a:solidFill>
+                  <a:srgbClr val="9CDCFE"/>
+                </a:solidFill>
+                <a:latin typeface="Consolas" panose="020B0609020204030204" pitchFamily="49" charset="0"/>
+              </a:rPr>
+              <a:t>state</a:t>
+            </a:r>
+            <a:r>
+              <a:rPr lang="da-DK" sz="1400" smtClean="0">
+                <a:solidFill>
+                  <a:srgbClr val="D4D4D4"/>
+                </a:solidFill>
+                <a:latin typeface="Consolas" panose="020B0609020204030204" pitchFamily="49" charset="0"/>
+              </a:rPr>
+              <a:t> </a:t>
+            </a:r>
+            <a:r>
+              <a:rPr lang="da-DK" sz="1400">
+                <a:solidFill>
+                  <a:srgbClr val="D4D4D4"/>
+                </a:solidFill>
+                <a:latin typeface="Consolas" panose="020B0609020204030204" pitchFamily="49" charset="0"/>
+              </a:rPr>
+              <a:t>= </a:t>
+            </a:r>
+            <a:r>
+              <a:rPr lang="da-DK" sz="1400" smtClean="0">
+                <a:solidFill>
+                  <a:srgbClr val="D4D4D4"/>
+                </a:solidFill>
+                <a:latin typeface="Consolas" panose="020B0609020204030204" pitchFamily="49" charset="0"/>
+              </a:rPr>
+              <a:t>{	</a:t>
+            </a:r>
+            <a:r>
+              <a:rPr lang="da-DK" sz="1400" smtClean="0">
+                <a:solidFill>
+                  <a:srgbClr val="9CDCFE"/>
+                </a:solidFill>
+                <a:latin typeface="Consolas" panose="020B0609020204030204" pitchFamily="49" charset="0"/>
+              </a:rPr>
+              <a:t>fullName</a:t>
+            </a:r>
+            <a:r>
+              <a:rPr lang="da-DK" sz="1400">
+                <a:solidFill>
+                  <a:srgbClr val="9CDCFE"/>
+                </a:solidFill>
+                <a:latin typeface="Consolas" panose="020B0609020204030204" pitchFamily="49" charset="0"/>
+              </a:rPr>
+              <a:t>:</a:t>
+            </a:r>
+            <a:r>
+              <a:rPr lang="da-DK" sz="1400">
+                <a:solidFill>
+                  <a:srgbClr val="D4D4D4"/>
+                </a:solidFill>
+                <a:latin typeface="Consolas" panose="020B0609020204030204" pitchFamily="49" charset="0"/>
+              </a:rPr>
+              <a:t> </a:t>
+            </a:r>
+            <a:r>
+              <a:rPr lang="da-DK" sz="1400">
+                <a:solidFill>
+                  <a:srgbClr val="9CDCFE"/>
+                </a:solidFill>
+                <a:latin typeface="Consolas" panose="020B0609020204030204" pitchFamily="49" charset="0"/>
+              </a:rPr>
+              <a:t>props</a:t>
+            </a:r>
+            <a:r>
+              <a:rPr lang="da-DK" sz="1400">
+                <a:solidFill>
+                  <a:srgbClr val="D4D4D4"/>
+                </a:solidFill>
+                <a:latin typeface="Consolas" panose="020B0609020204030204" pitchFamily="49" charset="0"/>
+              </a:rPr>
+              <a:t>.</a:t>
+            </a:r>
+            <a:r>
+              <a:rPr lang="da-DK" sz="1400">
+                <a:solidFill>
+                  <a:srgbClr val="9CDCFE"/>
+                </a:solidFill>
+                <a:latin typeface="Consolas" panose="020B0609020204030204" pitchFamily="49" charset="0"/>
+              </a:rPr>
+              <a:t>theDriver</a:t>
+            </a:r>
+            <a:r>
+              <a:rPr lang="da-DK" sz="1400">
+                <a:solidFill>
+                  <a:srgbClr val="D4D4D4"/>
+                </a:solidFill>
+                <a:latin typeface="Consolas" panose="020B0609020204030204" pitchFamily="49" charset="0"/>
+              </a:rPr>
+              <a:t>.</a:t>
+            </a:r>
+            <a:r>
+              <a:rPr lang="da-DK" sz="1400">
+                <a:solidFill>
+                  <a:srgbClr val="9CDCFE"/>
+                </a:solidFill>
+                <a:latin typeface="Consolas" panose="020B0609020204030204" pitchFamily="49" charset="0"/>
+              </a:rPr>
+              <a:t>givenName</a:t>
+            </a:r>
+            <a:r>
+              <a:rPr lang="da-DK" sz="1400">
+                <a:solidFill>
+                  <a:srgbClr val="D4D4D4"/>
+                </a:solidFill>
+                <a:latin typeface="Consolas" panose="020B0609020204030204" pitchFamily="49" charset="0"/>
+              </a:rPr>
+              <a:t> + </a:t>
+            </a:r>
+            <a:r>
+              <a:rPr lang="da-DK" sz="1400">
+                <a:solidFill>
+                  <a:srgbClr val="CE9178"/>
+                </a:solidFill>
+                <a:latin typeface="Consolas" panose="020B0609020204030204" pitchFamily="49" charset="0"/>
+              </a:rPr>
+              <a:t>" </a:t>
+            </a:r>
+            <a:r>
+              <a:rPr lang="da-DK" sz="1400">
+                <a:solidFill>
+                  <a:srgbClr val="CE9178"/>
+                </a:solidFill>
+                <a:latin typeface="Consolas" panose="020B0609020204030204" pitchFamily="49" charset="0"/>
+              </a:rPr>
+              <a:t>"</a:t>
+            </a:r>
+            <a:r>
+              <a:rPr lang="da-DK" sz="1400">
+                <a:solidFill>
+                  <a:srgbClr val="D4D4D4"/>
+                </a:solidFill>
+                <a:latin typeface="Consolas" panose="020B0609020204030204" pitchFamily="49" charset="0"/>
+              </a:rPr>
+              <a:t> </a:t>
+            </a:r>
+            <a:endParaRPr lang="da-DK" sz="1400" smtClean="0">
+              <a:solidFill>
+                <a:srgbClr val="D4D4D4"/>
+              </a:solidFill>
+              <a:latin typeface="Consolas" panose="020B0609020204030204" pitchFamily="49" charset="0"/>
+            </a:endParaRPr>
+          </a:p>
+          <a:p>
+            <a:pPr defTabSz="360000"/>
+            <a:r>
+              <a:rPr lang="da-DK" sz="1400">
+                <a:solidFill>
+                  <a:srgbClr val="D4D4D4"/>
+                </a:solidFill>
+                <a:latin typeface="Consolas" panose="020B0609020204030204" pitchFamily="49" charset="0"/>
+              </a:rPr>
+              <a:t>	</a:t>
+            </a:r>
+            <a:r>
+              <a:rPr lang="da-DK" sz="1400" smtClean="0">
+                <a:solidFill>
+                  <a:srgbClr val="D4D4D4"/>
+                </a:solidFill>
+                <a:latin typeface="Consolas" panose="020B0609020204030204" pitchFamily="49" charset="0"/>
+              </a:rPr>
+              <a:t>							 + </a:t>
+            </a:r>
+            <a:r>
+              <a:rPr lang="da-DK" sz="1400">
+                <a:solidFill>
+                  <a:srgbClr val="9CDCFE"/>
+                </a:solidFill>
+                <a:latin typeface="Consolas" panose="020B0609020204030204" pitchFamily="49" charset="0"/>
+              </a:rPr>
+              <a:t>props</a:t>
+            </a:r>
+            <a:r>
+              <a:rPr lang="da-DK" sz="1400">
+                <a:solidFill>
+                  <a:srgbClr val="D4D4D4"/>
+                </a:solidFill>
+                <a:latin typeface="Consolas" panose="020B0609020204030204" pitchFamily="49" charset="0"/>
+              </a:rPr>
+              <a:t>.</a:t>
+            </a:r>
+            <a:r>
+              <a:rPr lang="da-DK" sz="1400">
+                <a:solidFill>
+                  <a:srgbClr val="9CDCFE"/>
+                </a:solidFill>
+                <a:latin typeface="Consolas" panose="020B0609020204030204" pitchFamily="49" charset="0"/>
+              </a:rPr>
+              <a:t>theDriver</a:t>
+            </a:r>
+            <a:r>
+              <a:rPr lang="da-DK" sz="1400">
+                <a:solidFill>
+                  <a:srgbClr val="D4D4D4"/>
+                </a:solidFill>
+                <a:latin typeface="Consolas" panose="020B0609020204030204" pitchFamily="49" charset="0"/>
+              </a:rPr>
+              <a:t>.</a:t>
+            </a:r>
+            <a:r>
+              <a:rPr lang="da-DK" sz="1400">
+                <a:solidFill>
+                  <a:srgbClr val="9CDCFE"/>
+                </a:solidFill>
+                <a:latin typeface="Consolas" panose="020B0609020204030204" pitchFamily="49" charset="0"/>
+              </a:rPr>
+              <a:t>familyName</a:t>
+            </a:r>
+            <a:r>
+              <a:rPr lang="da-DK" sz="1400">
+                <a:solidFill>
+                  <a:srgbClr val="D4D4D4"/>
+                </a:solidFill>
+                <a:latin typeface="Consolas" panose="020B0609020204030204" pitchFamily="49" charset="0"/>
+              </a:rPr>
+              <a:t>,</a:t>
+            </a:r>
+          </a:p>
+          <a:p>
+            <a:pPr defTabSz="360000"/>
+            <a:r>
+              <a:rPr lang="da-DK" sz="1400" smtClean="0">
+                <a:solidFill>
+                  <a:srgbClr val="9CDCFE"/>
+                </a:solidFill>
+                <a:latin typeface="Consolas" panose="020B0609020204030204" pitchFamily="49" charset="0"/>
+              </a:rPr>
+              <a:t>						country</a:t>
+            </a:r>
+            <a:r>
+              <a:rPr lang="da-DK" sz="1400">
+                <a:solidFill>
+                  <a:srgbClr val="9CDCFE"/>
+                </a:solidFill>
+                <a:latin typeface="Consolas" panose="020B0609020204030204" pitchFamily="49" charset="0"/>
+              </a:rPr>
+              <a:t>:</a:t>
+            </a:r>
+            <a:r>
+              <a:rPr lang="da-DK" sz="1400">
+                <a:solidFill>
+                  <a:srgbClr val="D4D4D4"/>
+                </a:solidFill>
+                <a:latin typeface="Consolas" panose="020B0609020204030204" pitchFamily="49" charset="0"/>
+              </a:rPr>
+              <a:t> </a:t>
+            </a:r>
+            <a:r>
+              <a:rPr lang="da-DK" sz="1400" smtClean="0">
+                <a:solidFill>
+                  <a:srgbClr val="9CDCFE"/>
+                </a:solidFill>
+                <a:latin typeface="Consolas" panose="020B0609020204030204" pitchFamily="49" charset="0"/>
+              </a:rPr>
+              <a:t>props</a:t>
+            </a:r>
+            <a:r>
+              <a:rPr lang="da-DK" sz="1400" smtClean="0">
+                <a:solidFill>
+                  <a:srgbClr val="D4D4D4"/>
+                </a:solidFill>
+                <a:latin typeface="Consolas" panose="020B0609020204030204" pitchFamily="49" charset="0"/>
+              </a:rPr>
+              <a:t>.</a:t>
+            </a:r>
+            <a:r>
+              <a:rPr lang="da-DK" sz="1400" smtClean="0">
+                <a:solidFill>
+                  <a:srgbClr val="9CDCFE"/>
+                </a:solidFill>
+                <a:latin typeface="Consolas" panose="020B0609020204030204" pitchFamily="49" charset="0"/>
+              </a:rPr>
+              <a:t>theDriver</a:t>
+            </a:r>
+            <a:r>
+              <a:rPr lang="da-DK" sz="1400" smtClean="0">
+                <a:solidFill>
+                  <a:srgbClr val="D4D4D4"/>
+                </a:solidFill>
+                <a:latin typeface="Consolas" panose="020B0609020204030204" pitchFamily="49" charset="0"/>
+              </a:rPr>
+              <a:t>.</a:t>
+            </a:r>
+            <a:r>
+              <a:rPr lang="da-DK" sz="1400" smtClean="0">
+                <a:solidFill>
+                  <a:srgbClr val="9CDCFE"/>
+                </a:solidFill>
+                <a:latin typeface="Consolas" panose="020B0609020204030204" pitchFamily="49" charset="0"/>
+              </a:rPr>
+              <a:t>nationality</a:t>
+            </a:r>
+            <a:r>
+              <a:rPr lang="da-DK" sz="1400" smtClean="0">
+                <a:solidFill>
+                  <a:srgbClr val="D4D4D4"/>
+                </a:solidFill>
+                <a:latin typeface="Consolas" panose="020B0609020204030204" pitchFamily="49" charset="0"/>
+              </a:rPr>
+              <a:t>};</a:t>
+            </a:r>
+            <a:endParaRPr lang="da-DK" sz="1400">
+              <a:solidFill>
+                <a:srgbClr val="D4D4D4"/>
+              </a:solidFill>
+              <a:latin typeface="Consolas" panose="020B0609020204030204" pitchFamily="49" charset="0"/>
+            </a:endParaRPr>
+          </a:p>
+          <a:p>
+            <a:pPr defTabSz="360000"/>
+            <a:r>
+              <a:rPr lang="da-DK" sz="1400" smtClean="0">
+                <a:solidFill>
+                  <a:srgbClr val="D4D4D4"/>
+                </a:solidFill>
+                <a:latin typeface="Consolas" panose="020B0609020204030204" pitchFamily="49" charset="0"/>
+              </a:rPr>
+              <a:t>	}</a:t>
+            </a:r>
+            <a:endParaRPr lang="da-DK" sz="1400">
+              <a:solidFill>
+                <a:srgbClr val="D4D4D4"/>
+              </a:solidFill>
+              <a:latin typeface="Consolas" panose="020B0609020204030204" pitchFamily="49" charset="0"/>
+            </a:endParaRPr>
+          </a:p>
+          <a:p>
+            <a:pPr defTabSz="360000"/>
+            <a:r>
+              <a:rPr lang="da-DK" sz="1400">
+                <a:solidFill>
+                  <a:srgbClr val="D4D4D4"/>
+                </a:solidFill>
+                <a:latin typeface="Consolas" panose="020B0609020204030204" pitchFamily="49" charset="0"/>
+              </a:rPr>
+              <a:t/>
+            </a:r>
+            <a:br>
+              <a:rPr lang="da-DK" sz="1400">
+                <a:solidFill>
+                  <a:srgbClr val="D4D4D4"/>
+                </a:solidFill>
+                <a:latin typeface="Consolas" panose="020B0609020204030204" pitchFamily="49" charset="0"/>
+              </a:rPr>
+            </a:br>
+            <a:r>
+              <a:rPr lang="da-DK" sz="1400" smtClean="0">
+                <a:solidFill>
+                  <a:srgbClr val="D4D4D4"/>
+                </a:solidFill>
+                <a:latin typeface="Consolas" panose="020B0609020204030204" pitchFamily="49" charset="0"/>
+              </a:rPr>
+              <a:t>	</a:t>
+            </a:r>
+            <a:r>
+              <a:rPr lang="da-DK" sz="1400" smtClean="0">
+                <a:solidFill>
+                  <a:srgbClr val="DCDCAA"/>
+                </a:solidFill>
+                <a:latin typeface="Consolas" panose="020B0609020204030204" pitchFamily="49" charset="0"/>
+              </a:rPr>
+              <a:t>render</a:t>
+            </a:r>
+            <a:r>
+              <a:rPr lang="da-DK" sz="1400">
+                <a:solidFill>
+                  <a:srgbClr val="D4D4D4"/>
+                </a:solidFill>
+                <a:latin typeface="Consolas" panose="020B0609020204030204" pitchFamily="49" charset="0"/>
+              </a:rPr>
+              <a:t>() {</a:t>
+            </a:r>
+          </a:p>
+          <a:p>
+            <a:pPr defTabSz="360000"/>
+            <a:r>
+              <a:rPr lang="da-DK" sz="1400" smtClean="0">
+                <a:solidFill>
+                  <a:srgbClr val="C586C0"/>
+                </a:solidFill>
+                <a:latin typeface="Consolas" panose="020B0609020204030204" pitchFamily="49" charset="0"/>
+              </a:rPr>
+              <a:t>		return</a:t>
+            </a:r>
+            <a:r>
+              <a:rPr lang="da-DK" sz="1400" smtClean="0">
+                <a:solidFill>
+                  <a:srgbClr val="D4D4D4"/>
+                </a:solidFill>
+                <a:latin typeface="Consolas" panose="020B0609020204030204" pitchFamily="49" charset="0"/>
+              </a:rPr>
+              <a:t> (</a:t>
+            </a:r>
+          </a:p>
+          <a:p>
+            <a:pPr defTabSz="360000"/>
+            <a:r>
+              <a:rPr lang="da-DK" sz="1400">
+                <a:solidFill>
+                  <a:srgbClr val="D4D4D4"/>
+                </a:solidFill>
+                <a:latin typeface="Consolas" panose="020B0609020204030204" pitchFamily="49" charset="0"/>
+              </a:rPr>
+              <a:t>	</a:t>
+            </a:r>
+            <a:r>
+              <a:rPr lang="da-DK" sz="1400" smtClean="0">
+                <a:solidFill>
+                  <a:srgbClr val="D4D4D4"/>
+                </a:solidFill>
+                <a:latin typeface="Consolas" panose="020B0609020204030204" pitchFamily="49" charset="0"/>
+              </a:rPr>
+              <a:t>		</a:t>
+            </a:r>
+            <a:r>
+              <a:rPr lang="da-DK" sz="1400">
+                <a:solidFill>
+                  <a:srgbClr val="4EC9B0"/>
+                </a:solidFill>
+                <a:latin typeface="Consolas" panose="020B0609020204030204" pitchFamily="49" charset="0"/>
+              </a:rPr>
+              <a:t> </a:t>
+            </a:r>
+            <a:r>
+              <a:rPr lang="da-DK" sz="1400" smtClean="0">
+                <a:solidFill>
+                  <a:srgbClr val="4EC9B0"/>
+                </a:solidFill>
+                <a:latin typeface="Consolas" panose="020B0609020204030204" pitchFamily="49" charset="0"/>
+              </a:rPr>
+              <a:t>// Implementation of render</a:t>
+            </a:r>
+            <a:endParaRPr lang="da-DK" sz="1400">
+              <a:solidFill>
+                <a:srgbClr val="D4D4D4"/>
+              </a:solidFill>
+              <a:latin typeface="Consolas" panose="020B0609020204030204" pitchFamily="49" charset="0"/>
+            </a:endParaRPr>
+          </a:p>
+          <a:p>
+            <a:pPr defTabSz="360000"/>
+            <a:r>
+              <a:rPr lang="da-DK" sz="1400" smtClean="0">
+                <a:solidFill>
+                  <a:srgbClr val="D4D4D4"/>
+                </a:solidFill>
+                <a:latin typeface="Consolas" panose="020B0609020204030204" pitchFamily="49" charset="0"/>
+              </a:rPr>
+              <a:t>		);</a:t>
+            </a:r>
+            <a:endParaRPr lang="da-DK" sz="1400">
+              <a:solidFill>
+                <a:srgbClr val="D4D4D4"/>
+              </a:solidFill>
+              <a:latin typeface="Consolas" panose="020B0609020204030204" pitchFamily="49" charset="0"/>
+            </a:endParaRPr>
+          </a:p>
+          <a:p>
+            <a:pPr defTabSz="360000"/>
+            <a:r>
+              <a:rPr lang="da-DK" sz="1400" smtClean="0">
+                <a:solidFill>
+                  <a:srgbClr val="D4D4D4"/>
+                </a:solidFill>
+                <a:latin typeface="Consolas" panose="020B0609020204030204" pitchFamily="49" charset="0"/>
+              </a:rPr>
+              <a:t>	}</a:t>
+            </a:r>
+            <a:endParaRPr lang="da-DK" sz="1400">
+              <a:solidFill>
+                <a:srgbClr val="D4D4D4"/>
+              </a:solidFill>
+              <a:latin typeface="Consolas" panose="020B0609020204030204" pitchFamily="49" charset="0"/>
+            </a:endParaRPr>
+          </a:p>
+          <a:p>
+            <a:pPr defTabSz="360000"/>
+            <a:r>
+              <a:rPr lang="da-DK" sz="1400">
+                <a:solidFill>
+                  <a:srgbClr val="D4D4D4"/>
+                </a:solidFill>
+                <a:latin typeface="Consolas" panose="020B0609020204030204" pitchFamily="49" charset="0"/>
+              </a:rPr>
+              <a:t>}</a:t>
+            </a:r>
+          </a:p>
+          <a:p>
+            <a:pPr defTabSz="360000"/>
+            <a:endParaRPr lang="da-DK" sz="1400">
+              <a:solidFill>
+                <a:srgbClr val="D4D4D4"/>
+              </a:solidFill>
+              <a:latin typeface="Consolas" panose="020B0609020204030204" pitchFamily="49" charset="0"/>
+            </a:endParaRPr>
+          </a:p>
+        </p:txBody>
+      </p:sp>
+    </p:spTree>
+    <p:extLst>
+      <p:ext uri="{BB962C8B-B14F-4D97-AF65-F5344CB8AC3E}">
+        <p14:creationId xmlns:p14="http://schemas.microsoft.com/office/powerpoint/2010/main" val="1225980039"/>
+      </p:ext>
+    </p:extLst>
+  </p:cSld>
+  <p:clrMapOvr>
+    <a:masterClrMapping/>
+  </p:clrMapOvr>
+  <p:timing>
+    <p:tnLst>
+      <p:par>
+        <p:cTn id="1" dur="indefinite" restart="never" nodeType="tmRoot"/>
+      </p:par>
+    </p:tnLst>
+  </p:timing>
+</p:sld>
+</file>
+
+<file path=ppt/slides/slide37.xml><?xml version="1.0" encoding="utf-8"?>
+<p:sld xmlns:a="http://schemas.openxmlformats.org/drawingml/2006/main" xmlns:r="http://schemas.openxmlformats.org/officeDocument/2006/relationships" xmlns:p="http://schemas.openxmlformats.org/presentationml/2006/main">
+  <p:cSld>
+    <p:spTree>
+      <p:nvGrpSpPr>
+        <p:cNvPr id="1" name=""/>
+        <p:cNvGrpSpPr/>
+        <p:nvPr/>
+      </p:nvGrpSpPr>
+      <p:grpSpPr>
+        <a:xfrm>
+          <a:off x="0" y="0"/>
+          <a:ext cx="0" cy="0"/>
+          <a:chOff x="0" y="0"/>
+          <a:chExt cx="0" cy="0"/>
+        </a:xfrm>
+      </p:grpSpPr>
+      <p:sp>
+        <p:nvSpPr>
+          <p:cNvPr id="2" name="Titel 1"/>
+          <p:cNvSpPr>
+            <a:spLocks noGrp="1"/>
+          </p:cNvSpPr>
+          <p:nvPr>
+            <p:ph type="title"/>
+          </p:nvPr>
+        </p:nvSpPr>
+        <p:spPr/>
+        <p:txBody>
+          <a:bodyPr/>
+          <a:lstStyle/>
+          <a:p>
+            <a:r>
+              <a:rPr lang="da-DK" b="1" smtClean="0"/>
+              <a:t>React – Components</a:t>
+            </a:r>
+            <a:endParaRPr lang="da-DK" b="1"/>
+          </a:p>
+        </p:txBody>
+      </p:sp>
+      <p:sp>
+        <p:nvSpPr>
+          <p:cNvPr id="3" name="Pladsholder til indhold 2"/>
+          <p:cNvSpPr>
+            <a:spLocks noGrp="1"/>
+          </p:cNvSpPr>
+          <p:nvPr>
+            <p:ph idx="1"/>
+          </p:nvPr>
+        </p:nvSpPr>
+        <p:spPr>
+          <a:xfrm>
+            <a:off x="838201" y="1825625"/>
+            <a:ext cx="7453183" cy="4351338"/>
+          </a:xfrm>
+        </p:spPr>
+        <p:txBody>
+          <a:bodyPr>
+            <a:normAutofit/>
+          </a:bodyPr>
+          <a:lstStyle/>
+          <a:p>
+            <a:r>
+              <a:rPr lang="da-DK" sz="3200" smtClean="0"/>
+              <a:t>Class-based components can use </a:t>
+            </a:r>
+            <a:r>
+              <a:rPr lang="da-DK" sz="3200" b="1" smtClean="0"/>
+              <a:t>state</a:t>
+            </a:r>
+          </a:p>
+          <a:p>
+            <a:r>
+              <a:rPr lang="da-DK" sz="3200" smtClean="0"/>
+              <a:t>The state is just an ”instance field”, which will contain an object with data </a:t>
+            </a:r>
+            <a:r>
+              <a:rPr lang="da-DK" sz="3200" u="sng" smtClean="0"/>
+              <a:t>specific</a:t>
+            </a:r>
+            <a:r>
+              <a:rPr lang="da-DK" sz="3200" smtClean="0"/>
+              <a:t> for each instance of a component</a:t>
+            </a:r>
+          </a:p>
+          <a:p>
+            <a:r>
+              <a:rPr lang="da-DK" sz="3200"/>
+              <a:t>S</a:t>
+            </a:r>
+            <a:r>
+              <a:rPr lang="da-DK" sz="3200" smtClean="0"/>
+              <a:t>tate should be </a:t>
+            </a:r>
+            <a:r>
+              <a:rPr lang="da-DK" sz="3200" u="sng" smtClean="0"/>
+              <a:t>initialised</a:t>
+            </a:r>
+            <a:r>
+              <a:rPr lang="da-DK" sz="3200" smtClean="0"/>
+              <a:t> when the component instance is created</a:t>
+            </a:r>
+          </a:p>
+          <a:p>
+            <a:r>
+              <a:rPr lang="da-DK" sz="3200" b="1" smtClean="0">
+                <a:solidFill>
+                  <a:srgbClr val="FF0000"/>
+                </a:solidFill>
+              </a:rPr>
+              <a:t>NB</a:t>
+            </a:r>
+            <a:r>
+              <a:rPr lang="da-DK" sz="3200" smtClean="0"/>
+              <a:t>: state must </a:t>
+            </a:r>
+            <a:r>
+              <a:rPr lang="da-DK" sz="3200" u="sng" smtClean="0"/>
+              <a:t>only</a:t>
+            </a:r>
+            <a:r>
+              <a:rPr lang="da-DK" sz="3200" smtClean="0"/>
+              <a:t> be </a:t>
+            </a:r>
+            <a:r>
+              <a:rPr lang="da-DK" sz="3200" u="sng" smtClean="0"/>
+              <a:t>updated</a:t>
+            </a:r>
+            <a:r>
+              <a:rPr lang="da-DK" sz="3200" smtClean="0"/>
+              <a:t> by calling the method </a:t>
+            </a:r>
+            <a:r>
+              <a:rPr lang="da-DK" sz="3200" b="1" smtClean="0"/>
+              <a:t>setState</a:t>
+            </a:r>
+            <a:r>
+              <a:rPr lang="da-DK" sz="3200" smtClean="0"/>
+              <a:t>!</a:t>
+            </a:r>
+            <a:endParaRPr lang="da-DK" sz="3200" smtClean="0"/>
+          </a:p>
+        </p:txBody>
+      </p:sp>
+      <p:pic>
+        <p:nvPicPr>
+          <p:cNvPr id="1026" name="Picture 2" descr="Billedresultat for react logo"/>
+          <p:cNvPicPr>
+            <a:picLocks noChangeAspect="1" noChangeArrowheads="1"/>
+          </p:cNvPicPr>
+          <p:nvPr/>
+        </p:nvPicPr>
+        <p:blipFill>
+          <a:blip r:embed="rId2">
+            <a:extLst>
+              <a:ext uri="{28A0092B-C50C-407E-A947-70E740481C1C}">
+                <a14:useLocalDpi xmlns:a14="http://schemas.microsoft.com/office/drawing/2010/main" val="0"/>
+              </a:ext>
+            </a:extLst>
+          </a:blip>
+          <a:srcRect/>
+          <a:stretch>
+            <a:fillRect/>
+          </a:stretch>
+        </p:blipFill>
+        <p:spPr bwMode="auto">
+          <a:xfrm>
+            <a:off x="8180173" y="840312"/>
+            <a:ext cx="3761689" cy="2656694"/>
+          </a:xfrm>
+          <a:prstGeom prst="rect">
+            <a:avLst/>
+          </a:prstGeom>
+          <a:noFill/>
+          <a:extLst>
+            <a:ext uri="{909E8E84-426E-40DD-AFC4-6F175D3DCCD1}">
+              <a14:hiddenFill xmlns:a14="http://schemas.microsoft.com/office/drawing/2010/main">
+                <a:solidFill>
+                  <a:srgbClr val="FFFFFF"/>
+                </a:solidFill>
+              </a14:hiddenFill>
+            </a:ext>
+          </a:extLst>
+        </p:spPr>
+      </p:pic>
+    </p:spTree>
+    <p:extLst>
+      <p:ext uri="{BB962C8B-B14F-4D97-AF65-F5344CB8AC3E}">
+        <p14:creationId xmlns:p14="http://schemas.microsoft.com/office/powerpoint/2010/main" val="1159809450"/>
+      </p:ext>
+    </p:extLst>
+  </p:cSld>
+  <p:clrMapOvr>
+    <a:masterClrMapping/>
+  </p:clrMapOvr>
+  <p:timing>
+    <p:tnLst>
+      <p:par>
+        <p:cTn id="1" dur="indefinite" restart="never" nodeType="tmRoot"/>
+      </p:par>
+    </p:tnLst>
+  </p:timing>
+</p:sld>
+</file>
+
+<file path=ppt/slides/slide38.xml><?xml version="1.0" encoding="utf-8"?>
+<p:sld xmlns:a="http://schemas.openxmlformats.org/drawingml/2006/main" xmlns:r="http://schemas.openxmlformats.org/officeDocument/2006/relationships" xmlns:p="http://schemas.openxmlformats.org/presentationml/2006/main">
+  <p:cSld>
+    <p:spTree>
+      <p:nvGrpSpPr>
+        <p:cNvPr id="1" name=""/>
+        <p:cNvGrpSpPr/>
+        <p:nvPr/>
+      </p:nvGrpSpPr>
+      <p:grpSpPr>
+        <a:xfrm>
+          <a:off x="0" y="0"/>
+          <a:ext cx="0" cy="0"/>
+          <a:chOff x="0" y="0"/>
+          <a:chExt cx="0" cy="0"/>
+        </a:xfrm>
+      </p:grpSpPr>
+      <p:sp>
+        <p:nvSpPr>
+          <p:cNvPr id="2" name="Titel 1"/>
+          <p:cNvSpPr>
+            <a:spLocks noGrp="1"/>
+          </p:cNvSpPr>
+          <p:nvPr>
+            <p:ph type="title"/>
+          </p:nvPr>
+        </p:nvSpPr>
+        <p:spPr/>
+        <p:txBody>
+          <a:bodyPr/>
+          <a:lstStyle/>
+          <a:p>
+            <a:r>
+              <a:rPr lang="da-DK" b="1" smtClean="0"/>
+              <a:t>React – Components</a:t>
+            </a:r>
+            <a:endParaRPr lang="da-DK" b="1"/>
+          </a:p>
+        </p:txBody>
+      </p:sp>
+      <p:sp>
+        <p:nvSpPr>
+          <p:cNvPr id="3" name="Pladsholder til indhold 2"/>
+          <p:cNvSpPr>
+            <a:spLocks noGrp="1"/>
+          </p:cNvSpPr>
+          <p:nvPr>
+            <p:ph idx="1"/>
+          </p:nvPr>
+        </p:nvSpPr>
+        <p:spPr>
+          <a:xfrm>
+            <a:off x="838201" y="1825625"/>
+            <a:ext cx="7039231" cy="4351338"/>
+          </a:xfrm>
+        </p:spPr>
+        <p:txBody>
+          <a:bodyPr>
+            <a:normAutofit/>
+          </a:bodyPr>
+          <a:lstStyle/>
+          <a:p>
+            <a:r>
+              <a:rPr lang="da-DK" sz="3200" smtClean="0"/>
+              <a:t>Why do we need a ”state”…?</a:t>
+            </a:r>
+          </a:p>
+          <a:p>
+            <a:r>
+              <a:rPr lang="da-DK" sz="3200" smtClean="0"/>
+              <a:t>Typically for handling </a:t>
+            </a:r>
+            <a:r>
+              <a:rPr lang="da-DK" sz="3200" u="sng" smtClean="0"/>
+              <a:t>updates</a:t>
+            </a:r>
+            <a:r>
+              <a:rPr lang="da-DK" sz="3200" smtClean="0"/>
+              <a:t> to state</a:t>
+            </a:r>
+          </a:p>
+          <a:p>
+            <a:r>
+              <a:rPr lang="da-DK" sz="3200" smtClean="0"/>
+              <a:t>State could update when…</a:t>
+            </a:r>
+          </a:p>
+          <a:p>
+            <a:pPr lvl="1"/>
+            <a:r>
+              <a:rPr lang="da-DK" sz="2800" smtClean="0"/>
+              <a:t>…user enter data into the UI</a:t>
+            </a:r>
+          </a:p>
+          <a:p>
+            <a:pPr lvl="1"/>
+            <a:r>
+              <a:rPr lang="da-DK" sz="2800" smtClean="0"/>
+              <a:t>…an async call returns</a:t>
+            </a:r>
+          </a:p>
+          <a:p>
+            <a:r>
+              <a:rPr lang="da-DK" sz="3200" smtClean="0"/>
+              <a:t>Update of state should usually trigger a re-render; this is what </a:t>
+            </a:r>
+            <a:r>
+              <a:rPr lang="da-DK" sz="3200" b="1" smtClean="0"/>
+              <a:t>setState</a:t>
+            </a:r>
+            <a:r>
+              <a:rPr lang="da-DK" sz="3200" smtClean="0"/>
+              <a:t> does!</a:t>
+            </a:r>
+          </a:p>
+        </p:txBody>
+      </p:sp>
+      <p:pic>
+        <p:nvPicPr>
+          <p:cNvPr id="1026" name="Picture 2" descr="Billedresultat for react logo"/>
+          <p:cNvPicPr>
+            <a:picLocks noChangeAspect="1" noChangeArrowheads="1"/>
+          </p:cNvPicPr>
+          <p:nvPr/>
+        </p:nvPicPr>
+        <p:blipFill>
+          <a:blip r:embed="rId2">
+            <a:extLst>
+              <a:ext uri="{28A0092B-C50C-407E-A947-70E740481C1C}">
+                <a14:useLocalDpi xmlns:a14="http://schemas.microsoft.com/office/drawing/2010/main" val="0"/>
+              </a:ext>
+            </a:extLst>
+          </a:blip>
+          <a:srcRect/>
+          <a:stretch>
+            <a:fillRect/>
+          </a:stretch>
+        </p:blipFill>
+        <p:spPr bwMode="auto">
+          <a:xfrm>
+            <a:off x="8180173" y="840312"/>
+            <a:ext cx="3761689" cy="2656694"/>
+          </a:xfrm>
+          <a:prstGeom prst="rect">
+            <a:avLst/>
+          </a:prstGeom>
+          <a:noFill/>
+          <a:extLst>
+            <a:ext uri="{909E8E84-426E-40DD-AFC4-6F175D3DCCD1}">
+              <a14:hiddenFill xmlns:a14="http://schemas.microsoft.com/office/drawing/2010/main">
+                <a:solidFill>
+                  <a:srgbClr val="FFFFFF"/>
+                </a:solidFill>
+              </a14:hiddenFill>
+            </a:ext>
+          </a:extLst>
+        </p:spPr>
+      </p:pic>
+    </p:spTree>
+    <p:extLst>
+      <p:ext uri="{BB962C8B-B14F-4D97-AF65-F5344CB8AC3E}">
+        <p14:creationId xmlns:p14="http://schemas.microsoft.com/office/powerpoint/2010/main" val="4080038919"/>
+      </p:ext>
+    </p:extLst>
+  </p:cSld>
+  <p:clrMapOvr>
+    <a:masterClrMapping/>
+  </p:clrMapOvr>
+  <p:timing>
+    <p:tnLst>
+      <p:par>
+        <p:cTn id="1" dur="indefinite" restart="never" nodeType="tmRoot"/>
+      </p:par>
+    </p:tnLst>
+  </p:timing>
+</p:sld>
+</file>
+
+<file path=ppt/slides/slide39.xml><?xml version="1.0" encoding="utf-8"?>
+<p:sld xmlns:a="http://schemas.openxmlformats.org/drawingml/2006/main" xmlns:r="http://schemas.openxmlformats.org/officeDocument/2006/relationships" xmlns:p="http://schemas.openxmlformats.org/presentationml/2006/main">
+  <p:cSld>
+    <p:spTree>
+      <p:nvGrpSpPr>
+        <p:cNvPr id="1" name=""/>
+        <p:cNvGrpSpPr/>
+        <p:nvPr/>
+      </p:nvGrpSpPr>
+      <p:grpSpPr>
+        <a:xfrm>
+          <a:off x="0" y="0"/>
+          <a:ext cx="0" cy="0"/>
+          <a:chOff x="0" y="0"/>
+          <a:chExt cx="0" cy="0"/>
+        </a:xfrm>
+      </p:grpSpPr>
+      <p:sp>
+        <p:nvSpPr>
+          <p:cNvPr id="2" name="Titel 1"/>
+          <p:cNvSpPr>
+            <a:spLocks noGrp="1"/>
+          </p:cNvSpPr>
+          <p:nvPr>
+            <p:ph type="title"/>
+          </p:nvPr>
+        </p:nvSpPr>
+        <p:spPr/>
+        <p:txBody>
+          <a:bodyPr/>
+          <a:lstStyle/>
+          <a:p>
+            <a:r>
+              <a:rPr lang="da-DK" b="1" smtClean="0"/>
+              <a:t>React – example</a:t>
+            </a:r>
+            <a:endParaRPr lang="da-DK" b="1"/>
+          </a:p>
+        </p:txBody>
+      </p:sp>
+      <p:sp>
+        <p:nvSpPr>
+          <p:cNvPr id="6" name="Tekstfelt 5"/>
+          <p:cNvSpPr txBox="1"/>
+          <p:nvPr/>
+        </p:nvSpPr>
+        <p:spPr>
+          <a:xfrm>
+            <a:off x="739346" y="1639201"/>
+            <a:ext cx="8874212" cy="3754874"/>
+          </a:xfrm>
+          <a:prstGeom prst="rect">
+            <a:avLst/>
+          </a:prstGeom>
+          <a:solidFill>
+            <a:schemeClr val="tx1"/>
+          </a:solidFill>
+        </p:spPr>
+        <p:txBody>
+          <a:bodyPr wrap="square" rtlCol="0">
+            <a:spAutoFit/>
+          </a:bodyPr>
+          <a:lstStyle/>
+          <a:p>
+            <a:pPr defTabSz="360000"/>
+            <a:r>
+              <a:rPr lang="da-DK" sz="1400" smtClean="0">
+                <a:solidFill>
+                  <a:srgbClr val="569CD6"/>
+                </a:solidFill>
+                <a:latin typeface="Consolas" panose="020B0609020204030204" pitchFamily="49" charset="0"/>
+              </a:rPr>
+              <a:t>class</a:t>
+            </a:r>
+            <a:r>
+              <a:rPr lang="da-DK" sz="1400" smtClean="0">
+                <a:solidFill>
+                  <a:srgbClr val="D4D4D4"/>
+                </a:solidFill>
+                <a:latin typeface="Consolas" panose="020B0609020204030204" pitchFamily="49" charset="0"/>
+              </a:rPr>
+              <a:t> </a:t>
+            </a:r>
+            <a:r>
+              <a:rPr lang="da-DK" sz="1400">
+                <a:solidFill>
+                  <a:srgbClr val="4EC9B0"/>
+                </a:solidFill>
+                <a:latin typeface="Consolas" panose="020B0609020204030204" pitchFamily="49" charset="0"/>
+              </a:rPr>
+              <a:t>App</a:t>
+            </a:r>
+            <a:r>
+              <a:rPr lang="da-DK" sz="1400">
+                <a:solidFill>
+                  <a:srgbClr val="D4D4D4"/>
+                </a:solidFill>
+                <a:latin typeface="Consolas" panose="020B0609020204030204" pitchFamily="49" charset="0"/>
+              </a:rPr>
+              <a:t> </a:t>
+            </a:r>
+            <a:r>
+              <a:rPr lang="da-DK" sz="1400">
+                <a:solidFill>
+                  <a:srgbClr val="569CD6"/>
+                </a:solidFill>
+                <a:latin typeface="Consolas" panose="020B0609020204030204" pitchFamily="49" charset="0"/>
+              </a:rPr>
+              <a:t>extends</a:t>
+            </a:r>
+            <a:r>
+              <a:rPr lang="da-DK" sz="1400">
+                <a:solidFill>
+                  <a:srgbClr val="D4D4D4"/>
+                </a:solidFill>
+                <a:latin typeface="Consolas" panose="020B0609020204030204" pitchFamily="49" charset="0"/>
+              </a:rPr>
+              <a:t> </a:t>
+            </a:r>
+            <a:r>
+              <a:rPr lang="da-DK" sz="1400">
+                <a:solidFill>
+                  <a:srgbClr val="4EC9B0"/>
+                </a:solidFill>
+                <a:latin typeface="Consolas" panose="020B0609020204030204" pitchFamily="49" charset="0"/>
+              </a:rPr>
+              <a:t>React</a:t>
+            </a:r>
+            <a:r>
+              <a:rPr lang="da-DK" sz="1400">
+                <a:solidFill>
+                  <a:srgbClr val="D4D4D4"/>
+                </a:solidFill>
+                <a:latin typeface="Consolas" panose="020B0609020204030204" pitchFamily="49" charset="0"/>
+              </a:rPr>
+              <a:t>.</a:t>
+            </a:r>
+            <a:r>
+              <a:rPr lang="da-DK" sz="1400">
+                <a:solidFill>
+                  <a:srgbClr val="4EC9B0"/>
+                </a:solidFill>
+                <a:latin typeface="Consolas" panose="020B0609020204030204" pitchFamily="49" charset="0"/>
+              </a:rPr>
+              <a:t>Component</a:t>
+            </a:r>
+            <a:r>
+              <a:rPr lang="da-DK" sz="1400">
+                <a:solidFill>
+                  <a:srgbClr val="D4D4D4"/>
+                </a:solidFill>
+                <a:latin typeface="Consolas" panose="020B0609020204030204" pitchFamily="49" charset="0"/>
+              </a:rPr>
+              <a:t> {</a:t>
+            </a:r>
+          </a:p>
+          <a:p>
+            <a:pPr lvl="1" defTabSz="360000"/>
+            <a:r>
+              <a:rPr lang="da-DK" sz="1400">
+                <a:solidFill>
+                  <a:srgbClr val="9CDCFE"/>
+                </a:solidFill>
+                <a:latin typeface="Consolas" panose="020B0609020204030204" pitchFamily="49" charset="0"/>
+              </a:rPr>
+              <a:t>state</a:t>
+            </a:r>
+            <a:r>
+              <a:rPr lang="da-DK" sz="1400">
+                <a:solidFill>
+                  <a:srgbClr val="D4D4D4"/>
+                </a:solidFill>
+                <a:latin typeface="Consolas" panose="020B0609020204030204" pitchFamily="49" charset="0"/>
+              </a:rPr>
+              <a:t> = </a:t>
+            </a:r>
+            <a:r>
+              <a:rPr lang="da-DK" sz="1400">
+                <a:solidFill>
+                  <a:srgbClr val="D4D4D4"/>
+                </a:solidFill>
+                <a:latin typeface="Consolas" panose="020B0609020204030204" pitchFamily="49" charset="0"/>
+              </a:rPr>
+              <a:t>{ </a:t>
+            </a:r>
+            <a:r>
+              <a:rPr lang="da-DK" sz="1400" smtClean="0">
+                <a:solidFill>
+                  <a:srgbClr val="9CDCFE"/>
+                </a:solidFill>
+                <a:latin typeface="Consolas" panose="020B0609020204030204" pitchFamily="49" charset="0"/>
+              </a:rPr>
+              <a:t>arrayOfData:</a:t>
+            </a:r>
+            <a:r>
+              <a:rPr lang="da-DK" sz="1400" smtClean="0">
+                <a:solidFill>
+                  <a:srgbClr val="D4D4D4"/>
+                </a:solidFill>
+                <a:latin typeface="Consolas" panose="020B0609020204030204" pitchFamily="49" charset="0"/>
+              </a:rPr>
+              <a:t> [] };</a:t>
+            </a:r>
+            <a:endParaRPr lang="da-DK" sz="1400">
+              <a:solidFill>
+                <a:srgbClr val="D4D4D4"/>
+              </a:solidFill>
+              <a:latin typeface="Consolas" panose="020B0609020204030204" pitchFamily="49" charset="0"/>
+            </a:endParaRPr>
+          </a:p>
+          <a:p>
+            <a:pPr lvl="1" defTabSz="360000"/>
+            <a:r>
+              <a:rPr lang="da-DK" sz="1400">
+                <a:solidFill>
+                  <a:srgbClr val="D4D4D4"/>
+                </a:solidFill>
+                <a:latin typeface="Consolas" panose="020B0609020204030204" pitchFamily="49" charset="0"/>
+              </a:rPr>
+              <a:t/>
+            </a:r>
+            <a:br>
+              <a:rPr lang="da-DK" sz="1400">
+                <a:solidFill>
+                  <a:srgbClr val="D4D4D4"/>
+                </a:solidFill>
+                <a:latin typeface="Consolas" panose="020B0609020204030204" pitchFamily="49" charset="0"/>
+              </a:rPr>
+            </a:br>
+            <a:r>
+              <a:rPr lang="da-DK" sz="1400">
+                <a:solidFill>
+                  <a:srgbClr val="DCDCAA"/>
+                </a:solidFill>
+                <a:latin typeface="Consolas" panose="020B0609020204030204" pitchFamily="49" charset="0"/>
+              </a:rPr>
+              <a:t>getData</a:t>
+            </a:r>
+            <a:r>
+              <a:rPr lang="da-DK" sz="1400">
+                <a:solidFill>
+                  <a:srgbClr val="D4D4D4"/>
+                </a:solidFill>
+                <a:latin typeface="Consolas" panose="020B0609020204030204" pitchFamily="49" charset="0"/>
+              </a:rPr>
+              <a:t> = </a:t>
+            </a:r>
+            <a:r>
+              <a:rPr lang="da-DK" sz="1400">
+                <a:solidFill>
+                  <a:srgbClr val="569CD6"/>
+                </a:solidFill>
+                <a:latin typeface="Consolas" panose="020B0609020204030204" pitchFamily="49" charset="0"/>
+              </a:rPr>
+              <a:t>async</a:t>
+            </a:r>
+            <a:r>
+              <a:rPr lang="da-DK" sz="1400">
+                <a:solidFill>
+                  <a:srgbClr val="D4D4D4"/>
+                </a:solidFill>
+                <a:latin typeface="Consolas" panose="020B0609020204030204" pitchFamily="49" charset="0"/>
+              </a:rPr>
+              <a:t> () </a:t>
+            </a:r>
+            <a:r>
+              <a:rPr lang="da-DK" sz="1400">
+                <a:solidFill>
+                  <a:srgbClr val="569CD6"/>
+                </a:solidFill>
+                <a:latin typeface="Consolas" panose="020B0609020204030204" pitchFamily="49" charset="0"/>
+              </a:rPr>
+              <a:t>=&gt;</a:t>
+            </a:r>
+            <a:r>
+              <a:rPr lang="da-DK" sz="1400">
+                <a:solidFill>
+                  <a:srgbClr val="D4D4D4"/>
+                </a:solidFill>
+                <a:latin typeface="Consolas" panose="020B0609020204030204" pitchFamily="49" charset="0"/>
+              </a:rPr>
+              <a:t> {</a:t>
+            </a:r>
+          </a:p>
+          <a:p>
+            <a:pPr lvl="1" defTabSz="360000"/>
+            <a:r>
+              <a:rPr lang="da-DK" sz="1400" smtClean="0">
+                <a:solidFill>
+                  <a:srgbClr val="569CD6"/>
+                </a:solidFill>
+                <a:latin typeface="Consolas" panose="020B0609020204030204" pitchFamily="49" charset="0"/>
+              </a:rPr>
+              <a:t>	const</a:t>
+            </a:r>
+            <a:r>
+              <a:rPr lang="da-DK" sz="1400" smtClean="0">
+                <a:solidFill>
+                  <a:srgbClr val="D4D4D4"/>
+                </a:solidFill>
+                <a:latin typeface="Consolas" panose="020B0609020204030204" pitchFamily="49" charset="0"/>
+              </a:rPr>
+              <a:t> </a:t>
+            </a:r>
+            <a:r>
+              <a:rPr lang="da-DK" sz="1400">
+                <a:solidFill>
+                  <a:srgbClr val="9CDCFE"/>
+                </a:solidFill>
+                <a:latin typeface="Consolas" panose="020B0609020204030204" pitchFamily="49" charset="0"/>
+              </a:rPr>
+              <a:t>response</a:t>
+            </a:r>
+            <a:r>
+              <a:rPr lang="da-DK" sz="1400">
+                <a:solidFill>
+                  <a:srgbClr val="D4D4D4"/>
+                </a:solidFill>
+                <a:latin typeface="Consolas" panose="020B0609020204030204" pitchFamily="49" charset="0"/>
+              </a:rPr>
+              <a:t> = </a:t>
+            </a:r>
+            <a:r>
+              <a:rPr lang="da-DK" sz="1400">
+                <a:solidFill>
+                  <a:srgbClr val="C586C0"/>
+                </a:solidFill>
+                <a:latin typeface="Consolas" panose="020B0609020204030204" pitchFamily="49" charset="0"/>
+              </a:rPr>
+              <a:t>await</a:t>
+            </a:r>
+            <a:r>
+              <a:rPr lang="da-DK" sz="1400">
+                <a:solidFill>
+                  <a:srgbClr val="D4D4D4"/>
+                </a:solidFill>
+                <a:latin typeface="Consolas" panose="020B0609020204030204" pitchFamily="49" charset="0"/>
+              </a:rPr>
+              <a:t> </a:t>
+            </a:r>
+            <a:r>
+              <a:rPr lang="da-DK" sz="1400">
+                <a:solidFill>
+                  <a:srgbClr val="9CDCFE"/>
+                </a:solidFill>
+                <a:latin typeface="Consolas" panose="020B0609020204030204" pitchFamily="49" charset="0"/>
+              </a:rPr>
+              <a:t>axios</a:t>
+            </a:r>
+            <a:r>
+              <a:rPr lang="da-DK" sz="1400">
+                <a:solidFill>
+                  <a:srgbClr val="D4D4D4"/>
+                </a:solidFill>
+                <a:latin typeface="Consolas" panose="020B0609020204030204" pitchFamily="49" charset="0"/>
+              </a:rPr>
+              <a:t>.</a:t>
+            </a:r>
+            <a:r>
+              <a:rPr lang="da-DK" sz="1400">
+                <a:solidFill>
+                  <a:srgbClr val="DCDCAA"/>
+                </a:solidFill>
+                <a:latin typeface="Consolas" panose="020B0609020204030204" pitchFamily="49" charset="0"/>
+              </a:rPr>
+              <a:t>get</a:t>
+            </a:r>
+            <a:r>
+              <a:rPr lang="da-DK" sz="1400">
+                <a:solidFill>
+                  <a:srgbClr val="D4D4D4"/>
+                </a:solidFill>
+                <a:latin typeface="Consolas" panose="020B0609020204030204" pitchFamily="49" charset="0"/>
+              </a:rPr>
+              <a:t>(</a:t>
+            </a:r>
+            <a:r>
+              <a:rPr lang="da-DK" sz="1400">
+                <a:solidFill>
+                  <a:srgbClr val="CE9178"/>
+                </a:solidFill>
+                <a:latin typeface="Consolas" panose="020B0609020204030204" pitchFamily="49" charset="0"/>
+              </a:rPr>
+              <a:t>"</a:t>
+            </a:r>
+            <a:r>
+              <a:rPr lang="da-DK" sz="1400">
+                <a:solidFill>
+                  <a:srgbClr val="CE9178"/>
+                </a:solidFill>
+                <a:latin typeface="Consolas" panose="020B0609020204030204" pitchFamily="49" charset="0"/>
+              </a:rPr>
+              <a:t>https</a:t>
+            </a:r>
+            <a:r>
+              <a:rPr lang="da-DK" sz="1400" smtClean="0">
+                <a:solidFill>
+                  <a:srgbClr val="CE9178"/>
+                </a:solidFill>
+                <a:latin typeface="Consolas" panose="020B0609020204030204" pitchFamily="49" charset="0"/>
+              </a:rPr>
+              <a:t>://my-web-service.com/api/..."</a:t>
+            </a:r>
+            <a:r>
+              <a:rPr lang="da-DK" sz="1400" smtClean="0">
+                <a:solidFill>
+                  <a:srgbClr val="D4D4D4"/>
+                </a:solidFill>
+                <a:latin typeface="Consolas" panose="020B0609020204030204" pitchFamily="49" charset="0"/>
+              </a:rPr>
+              <a:t>);</a:t>
+            </a:r>
+            <a:endParaRPr lang="da-DK" sz="1400">
+              <a:solidFill>
+                <a:srgbClr val="D4D4D4"/>
+              </a:solidFill>
+              <a:latin typeface="Consolas" panose="020B0609020204030204" pitchFamily="49" charset="0"/>
+            </a:endParaRPr>
+          </a:p>
+          <a:p>
+            <a:pPr lvl="1" defTabSz="360000"/>
+            <a:r>
+              <a:rPr lang="da-DK" sz="1400" smtClean="0">
+                <a:solidFill>
+                  <a:srgbClr val="569CD6"/>
+                </a:solidFill>
+                <a:latin typeface="Consolas" panose="020B0609020204030204" pitchFamily="49" charset="0"/>
+              </a:rPr>
+              <a:t>	this</a:t>
+            </a:r>
+            <a:r>
+              <a:rPr lang="da-DK" sz="1400" smtClean="0">
+                <a:solidFill>
+                  <a:srgbClr val="D4D4D4"/>
+                </a:solidFill>
+                <a:latin typeface="Consolas" panose="020B0609020204030204" pitchFamily="49" charset="0"/>
+              </a:rPr>
+              <a:t>.</a:t>
+            </a:r>
+            <a:r>
+              <a:rPr lang="da-DK" sz="1400" smtClean="0">
+                <a:solidFill>
+                  <a:srgbClr val="DCDCAA"/>
+                </a:solidFill>
+                <a:latin typeface="Consolas" panose="020B0609020204030204" pitchFamily="49" charset="0"/>
+              </a:rPr>
+              <a:t>setState</a:t>
+            </a:r>
+            <a:r>
+              <a:rPr lang="da-DK" sz="1400" smtClean="0">
+                <a:solidFill>
+                  <a:srgbClr val="D4D4D4"/>
+                </a:solidFill>
+                <a:latin typeface="Consolas" panose="020B0609020204030204" pitchFamily="49" charset="0"/>
+              </a:rPr>
+              <a:t>({ </a:t>
+            </a:r>
+            <a:r>
+              <a:rPr lang="da-DK" sz="1400" smtClean="0">
+                <a:solidFill>
+                  <a:srgbClr val="9CDCFE"/>
+                </a:solidFill>
+                <a:latin typeface="Consolas" panose="020B0609020204030204" pitchFamily="49" charset="0"/>
+              </a:rPr>
+              <a:t>arrayOfData :</a:t>
+            </a:r>
+            <a:r>
+              <a:rPr lang="da-DK" sz="1400" smtClean="0">
+                <a:solidFill>
+                  <a:srgbClr val="D4D4D4"/>
+                </a:solidFill>
+                <a:latin typeface="Consolas" panose="020B0609020204030204" pitchFamily="49" charset="0"/>
+              </a:rPr>
+              <a:t> </a:t>
+            </a:r>
+            <a:r>
+              <a:rPr lang="da-DK" sz="1400" smtClean="0">
+                <a:solidFill>
+                  <a:srgbClr val="9CDCFE"/>
+                </a:solidFill>
+                <a:latin typeface="Consolas" panose="020B0609020204030204" pitchFamily="49" charset="0"/>
+              </a:rPr>
+              <a:t>response</a:t>
+            </a:r>
+            <a:r>
+              <a:rPr lang="da-DK" sz="1400" smtClean="0">
+                <a:solidFill>
+                  <a:srgbClr val="D4D4D4"/>
+                </a:solidFill>
+                <a:latin typeface="Consolas" panose="020B0609020204030204" pitchFamily="49" charset="0"/>
+              </a:rPr>
+              <a:t>.</a:t>
+            </a:r>
+            <a:r>
+              <a:rPr lang="da-DK" sz="1400" smtClean="0">
+                <a:solidFill>
+                  <a:srgbClr val="9CDCFE"/>
+                </a:solidFill>
+                <a:latin typeface="Consolas" panose="020B0609020204030204" pitchFamily="49" charset="0"/>
+              </a:rPr>
+              <a:t>data…</a:t>
+            </a:r>
+            <a:r>
+              <a:rPr lang="da-DK" sz="1400" smtClean="0">
+                <a:solidFill>
+                  <a:srgbClr val="D4D4D4"/>
+                </a:solidFill>
+                <a:latin typeface="Consolas" panose="020B0609020204030204" pitchFamily="49" charset="0"/>
+              </a:rPr>
+              <a:t> </a:t>
+            </a:r>
+            <a:r>
+              <a:rPr lang="da-DK" sz="1400">
+                <a:solidFill>
+                  <a:srgbClr val="D4D4D4"/>
+                </a:solidFill>
+                <a:latin typeface="Consolas" panose="020B0609020204030204" pitchFamily="49" charset="0"/>
+              </a:rPr>
+              <a:t>});</a:t>
+            </a:r>
+          </a:p>
+          <a:p>
+            <a:pPr lvl="1" defTabSz="360000"/>
+            <a:r>
+              <a:rPr lang="da-DK" sz="1400">
+                <a:solidFill>
+                  <a:srgbClr val="D4D4D4"/>
+                </a:solidFill>
+                <a:latin typeface="Consolas" panose="020B0609020204030204" pitchFamily="49" charset="0"/>
+              </a:rPr>
+              <a:t>};</a:t>
+            </a:r>
+          </a:p>
+          <a:p>
+            <a:pPr defTabSz="360000"/>
+            <a:r>
+              <a:rPr lang="da-DK" sz="1400">
+                <a:solidFill>
+                  <a:srgbClr val="D4D4D4"/>
+                </a:solidFill>
+                <a:latin typeface="Consolas" panose="020B0609020204030204" pitchFamily="49" charset="0"/>
+              </a:rPr>
+              <a:t/>
+            </a:r>
+            <a:br>
+              <a:rPr lang="da-DK" sz="1400">
+                <a:solidFill>
+                  <a:srgbClr val="D4D4D4"/>
+                </a:solidFill>
+                <a:latin typeface="Consolas" panose="020B0609020204030204" pitchFamily="49" charset="0"/>
+              </a:rPr>
+            </a:br>
+            <a:r>
+              <a:rPr lang="da-DK" sz="1400" smtClean="0">
+                <a:solidFill>
+                  <a:srgbClr val="D4D4D4"/>
+                </a:solidFill>
+                <a:latin typeface="Consolas" panose="020B0609020204030204" pitchFamily="49" charset="0"/>
+              </a:rPr>
+              <a:t>	</a:t>
+            </a:r>
+            <a:r>
+              <a:rPr lang="da-DK" sz="1400" smtClean="0">
+                <a:solidFill>
+                  <a:srgbClr val="DCDCAA"/>
+                </a:solidFill>
+                <a:latin typeface="Consolas" panose="020B0609020204030204" pitchFamily="49" charset="0"/>
+              </a:rPr>
+              <a:t>render</a:t>
+            </a:r>
+            <a:r>
+              <a:rPr lang="da-DK" sz="1400">
+                <a:solidFill>
+                  <a:srgbClr val="D4D4D4"/>
+                </a:solidFill>
+                <a:latin typeface="Consolas" panose="020B0609020204030204" pitchFamily="49" charset="0"/>
+              </a:rPr>
+              <a:t>() {</a:t>
+            </a:r>
+          </a:p>
+          <a:p>
+            <a:pPr defTabSz="360000"/>
+            <a:r>
+              <a:rPr lang="da-DK" sz="1400" smtClean="0">
+                <a:solidFill>
+                  <a:srgbClr val="C586C0"/>
+                </a:solidFill>
+                <a:latin typeface="Consolas" panose="020B0609020204030204" pitchFamily="49" charset="0"/>
+              </a:rPr>
+              <a:t>		return</a:t>
+            </a:r>
+            <a:r>
+              <a:rPr lang="da-DK" sz="1400" smtClean="0">
+                <a:solidFill>
+                  <a:srgbClr val="D4D4D4"/>
+                </a:solidFill>
+                <a:latin typeface="Consolas" panose="020B0609020204030204" pitchFamily="49" charset="0"/>
+              </a:rPr>
+              <a:t> </a:t>
+            </a:r>
+            <a:r>
+              <a:rPr lang="da-DK" sz="1400">
+                <a:solidFill>
+                  <a:srgbClr val="D4D4D4"/>
+                </a:solidFill>
+                <a:latin typeface="Consolas" panose="020B0609020204030204" pitchFamily="49" charset="0"/>
+              </a:rPr>
+              <a:t>(</a:t>
+            </a:r>
+          </a:p>
+          <a:p>
+            <a:pPr defTabSz="360000"/>
+            <a:r>
+              <a:rPr lang="da-DK" sz="1400" smtClean="0">
+                <a:solidFill>
+                  <a:srgbClr val="808080"/>
+                </a:solidFill>
+                <a:latin typeface="Consolas" panose="020B0609020204030204" pitchFamily="49" charset="0"/>
+              </a:rPr>
+              <a:t>			&lt;</a:t>
+            </a:r>
+            <a:r>
+              <a:rPr lang="da-DK" sz="1400" smtClean="0">
+                <a:solidFill>
+                  <a:srgbClr val="569CD6"/>
+                </a:solidFill>
+                <a:latin typeface="Consolas" panose="020B0609020204030204" pitchFamily="49" charset="0"/>
+              </a:rPr>
+              <a:t>div</a:t>
+            </a:r>
+            <a:r>
+              <a:rPr lang="da-DK" sz="1400" smtClean="0">
+                <a:solidFill>
+                  <a:srgbClr val="808080"/>
+                </a:solidFill>
+                <a:latin typeface="Consolas" panose="020B0609020204030204" pitchFamily="49" charset="0"/>
+              </a:rPr>
+              <a:t>&gt;					</a:t>
+            </a:r>
+          </a:p>
+          <a:p>
+            <a:pPr defTabSz="360000"/>
+            <a:r>
+              <a:rPr lang="da-DK" sz="1400" smtClean="0">
+                <a:solidFill>
+                  <a:srgbClr val="808080"/>
+                </a:solidFill>
+                <a:latin typeface="Consolas" panose="020B0609020204030204" pitchFamily="49" charset="0"/>
+              </a:rPr>
+              <a:t>				&lt;</a:t>
+            </a:r>
+            <a:r>
+              <a:rPr lang="da-DK" sz="1400">
+                <a:solidFill>
+                  <a:srgbClr val="569CD6"/>
+                </a:solidFill>
+                <a:latin typeface="Consolas" panose="020B0609020204030204" pitchFamily="49" charset="0"/>
+              </a:rPr>
+              <a:t>button</a:t>
+            </a:r>
+            <a:r>
+              <a:rPr lang="da-DK" sz="1400">
+                <a:solidFill>
+                  <a:srgbClr val="D4D4D4"/>
+                </a:solidFill>
+                <a:latin typeface="Consolas" panose="020B0609020204030204" pitchFamily="49" charset="0"/>
+              </a:rPr>
+              <a:t> </a:t>
+            </a:r>
+            <a:r>
+              <a:rPr lang="da-DK" sz="1400" smtClean="0">
+                <a:solidFill>
+                  <a:srgbClr val="9CDCFE"/>
+                </a:solidFill>
+                <a:latin typeface="Consolas" panose="020B0609020204030204" pitchFamily="49" charset="0"/>
+              </a:rPr>
+              <a:t>onClick</a:t>
+            </a:r>
+            <a:r>
+              <a:rPr lang="da-DK" sz="1400">
+                <a:solidFill>
+                  <a:srgbClr val="D4D4D4"/>
+                </a:solidFill>
+                <a:latin typeface="Consolas" panose="020B0609020204030204" pitchFamily="49" charset="0"/>
+              </a:rPr>
+              <a:t>=</a:t>
+            </a:r>
+            <a:r>
+              <a:rPr lang="da-DK" sz="1400">
+                <a:solidFill>
+                  <a:srgbClr val="569CD6"/>
+                </a:solidFill>
+                <a:latin typeface="Consolas" panose="020B0609020204030204" pitchFamily="49" charset="0"/>
+              </a:rPr>
+              <a:t>{</a:t>
+            </a:r>
+            <a:r>
+              <a:rPr lang="da-DK" sz="1400" smtClean="0">
+                <a:solidFill>
+                  <a:srgbClr val="569CD6"/>
+                </a:solidFill>
+                <a:latin typeface="Consolas" panose="020B0609020204030204" pitchFamily="49" charset="0"/>
+              </a:rPr>
+              <a:t>this</a:t>
+            </a:r>
+            <a:r>
+              <a:rPr lang="da-DK" sz="1400" smtClean="0">
+                <a:solidFill>
+                  <a:srgbClr val="D4D4D4"/>
+                </a:solidFill>
+                <a:latin typeface="Consolas" panose="020B0609020204030204" pitchFamily="49" charset="0"/>
+              </a:rPr>
+              <a:t>.</a:t>
+            </a:r>
+            <a:r>
+              <a:rPr lang="da-DK" sz="1400" smtClean="0">
+                <a:solidFill>
+                  <a:srgbClr val="9CDCFE"/>
+                </a:solidFill>
+                <a:latin typeface="Consolas" panose="020B0609020204030204" pitchFamily="49" charset="0"/>
+              </a:rPr>
+              <a:t>getData</a:t>
+            </a:r>
+            <a:r>
+              <a:rPr lang="da-DK" sz="1400" smtClean="0">
+                <a:solidFill>
+                  <a:srgbClr val="569CD6"/>
+                </a:solidFill>
+                <a:latin typeface="Consolas" panose="020B0609020204030204" pitchFamily="49" charset="0"/>
+              </a:rPr>
+              <a:t>}</a:t>
+            </a:r>
+            <a:r>
+              <a:rPr lang="da-DK" sz="1400" smtClean="0">
+                <a:solidFill>
+                  <a:srgbClr val="808080"/>
+                </a:solidFill>
+                <a:latin typeface="Consolas" panose="020B0609020204030204" pitchFamily="49" charset="0"/>
+              </a:rPr>
+              <a:t>&gt;</a:t>
+            </a:r>
+            <a:r>
+              <a:rPr lang="da-DK" sz="1400" smtClean="0">
+                <a:solidFill>
+                  <a:srgbClr val="D4D4D4"/>
+                </a:solidFill>
+                <a:latin typeface="Consolas" panose="020B0609020204030204" pitchFamily="49" charset="0"/>
+              </a:rPr>
+              <a:t>Get Data</a:t>
+            </a:r>
+            <a:r>
+              <a:rPr lang="da-DK" sz="1400" smtClean="0">
+                <a:solidFill>
+                  <a:srgbClr val="808080"/>
+                </a:solidFill>
+                <a:latin typeface="Consolas" panose="020B0609020204030204" pitchFamily="49" charset="0"/>
+              </a:rPr>
+              <a:t>&lt;/</a:t>
+            </a:r>
+            <a:r>
+              <a:rPr lang="da-DK" sz="1400">
+                <a:solidFill>
+                  <a:srgbClr val="569CD6"/>
+                </a:solidFill>
+                <a:latin typeface="Consolas" panose="020B0609020204030204" pitchFamily="49" charset="0"/>
+              </a:rPr>
+              <a:t>button</a:t>
+            </a:r>
+            <a:r>
+              <a:rPr lang="da-DK" sz="1400" smtClean="0">
+                <a:solidFill>
+                  <a:srgbClr val="808080"/>
+                </a:solidFill>
+                <a:latin typeface="Consolas" panose="020B0609020204030204" pitchFamily="49" charset="0"/>
+              </a:rPr>
+              <a:t>&gt;</a:t>
+            </a:r>
+            <a:endParaRPr lang="da-DK" sz="1400" smtClean="0">
+              <a:solidFill>
+                <a:srgbClr val="808080"/>
+              </a:solidFill>
+              <a:latin typeface="Consolas" panose="020B0609020204030204" pitchFamily="49" charset="0"/>
+            </a:endParaRPr>
+          </a:p>
+          <a:p>
+            <a:pPr defTabSz="360000"/>
+            <a:r>
+              <a:rPr lang="da-DK" sz="1400">
+                <a:solidFill>
+                  <a:srgbClr val="808080"/>
+                </a:solidFill>
+                <a:latin typeface="Consolas" panose="020B0609020204030204" pitchFamily="49" charset="0"/>
+              </a:rPr>
+              <a:t>	</a:t>
+            </a:r>
+            <a:r>
+              <a:rPr lang="da-DK" sz="1400" smtClean="0">
+                <a:solidFill>
+                  <a:srgbClr val="808080"/>
+                </a:solidFill>
+                <a:latin typeface="Consolas" panose="020B0609020204030204" pitchFamily="49" charset="0"/>
+              </a:rPr>
+              <a:t>			&lt;</a:t>
+            </a:r>
+            <a:r>
+              <a:rPr lang="da-DK" sz="1400">
+                <a:solidFill>
+                  <a:srgbClr val="569CD6"/>
+                </a:solidFill>
+                <a:latin typeface="Consolas" panose="020B0609020204030204" pitchFamily="49" charset="0"/>
+              </a:rPr>
+              <a:t>h2</a:t>
+            </a:r>
+            <a:r>
+              <a:rPr lang="da-DK" sz="1400">
+                <a:solidFill>
+                  <a:srgbClr val="808080"/>
+                </a:solidFill>
+                <a:latin typeface="Consolas" panose="020B0609020204030204" pitchFamily="49" charset="0"/>
+              </a:rPr>
+              <a:t>&gt;</a:t>
+            </a:r>
+            <a:r>
+              <a:rPr lang="da-DK" sz="1400">
+                <a:solidFill>
+                  <a:srgbClr val="D4D4D4"/>
+                </a:solidFill>
+                <a:latin typeface="Consolas" panose="020B0609020204030204" pitchFamily="49" charset="0"/>
+              </a:rPr>
+              <a:t>Got </a:t>
+            </a:r>
+            <a:r>
+              <a:rPr lang="da-DK" sz="1400">
+                <a:solidFill>
+                  <a:srgbClr val="569CD6"/>
+                </a:solidFill>
+                <a:latin typeface="Consolas" panose="020B0609020204030204" pitchFamily="49" charset="0"/>
+              </a:rPr>
+              <a:t>{this</a:t>
+            </a:r>
+            <a:r>
+              <a:rPr lang="da-DK" sz="1400">
+                <a:solidFill>
+                  <a:srgbClr val="D4D4D4"/>
+                </a:solidFill>
+                <a:latin typeface="Consolas" panose="020B0609020204030204" pitchFamily="49" charset="0"/>
+              </a:rPr>
+              <a:t>.</a:t>
+            </a:r>
+            <a:r>
+              <a:rPr lang="da-DK" sz="1400">
+                <a:solidFill>
+                  <a:srgbClr val="9CDCFE"/>
+                </a:solidFill>
+                <a:latin typeface="Consolas" panose="020B0609020204030204" pitchFamily="49" charset="0"/>
+              </a:rPr>
+              <a:t>state</a:t>
+            </a:r>
+            <a:r>
+              <a:rPr lang="da-DK" sz="1400">
+                <a:solidFill>
+                  <a:srgbClr val="D4D4D4"/>
+                </a:solidFill>
+                <a:latin typeface="Consolas" panose="020B0609020204030204" pitchFamily="49" charset="0"/>
+              </a:rPr>
+              <a:t>.</a:t>
+            </a:r>
+            <a:r>
+              <a:rPr lang="da-DK" sz="1400">
+                <a:solidFill>
+                  <a:srgbClr val="9CDCFE"/>
+                </a:solidFill>
+                <a:latin typeface="Consolas" panose="020B0609020204030204" pitchFamily="49" charset="0"/>
+              </a:rPr>
+              <a:t>arrayOfData</a:t>
+            </a:r>
+            <a:r>
+              <a:rPr lang="da-DK" sz="1400">
+                <a:solidFill>
+                  <a:srgbClr val="D4D4D4"/>
+                </a:solidFill>
+                <a:latin typeface="Consolas" panose="020B0609020204030204" pitchFamily="49" charset="0"/>
+              </a:rPr>
+              <a:t>.</a:t>
+            </a:r>
+            <a:r>
+              <a:rPr lang="da-DK" sz="1400">
+                <a:solidFill>
+                  <a:srgbClr val="9CDCFE"/>
+                </a:solidFill>
+                <a:latin typeface="Consolas" panose="020B0609020204030204" pitchFamily="49" charset="0"/>
+              </a:rPr>
+              <a:t>length</a:t>
+            </a:r>
+            <a:r>
+              <a:rPr lang="da-DK" sz="1400">
+                <a:solidFill>
+                  <a:srgbClr val="569CD6"/>
+                </a:solidFill>
+                <a:latin typeface="Consolas" panose="020B0609020204030204" pitchFamily="49" charset="0"/>
+              </a:rPr>
+              <a:t>}</a:t>
+            </a:r>
+            <a:r>
+              <a:rPr lang="da-DK" sz="1400">
+                <a:solidFill>
+                  <a:srgbClr val="D4D4D4"/>
+                </a:solidFill>
+                <a:latin typeface="Consolas" panose="020B0609020204030204" pitchFamily="49" charset="0"/>
+              </a:rPr>
+              <a:t> data instances</a:t>
+            </a:r>
+            <a:r>
+              <a:rPr lang="da-DK" sz="1400">
+                <a:solidFill>
+                  <a:srgbClr val="808080"/>
+                </a:solidFill>
+                <a:latin typeface="Consolas" panose="020B0609020204030204" pitchFamily="49" charset="0"/>
+              </a:rPr>
+              <a:t>&lt;/</a:t>
+            </a:r>
+            <a:r>
+              <a:rPr lang="da-DK" sz="1400">
+                <a:solidFill>
+                  <a:srgbClr val="569CD6"/>
+                </a:solidFill>
+                <a:latin typeface="Consolas" panose="020B0609020204030204" pitchFamily="49" charset="0"/>
+              </a:rPr>
+              <a:t>h2</a:t>
+            </a:r>
+            <a:r>
+              <a:rPr lang="da-DK" sz="1400">
+                <a:solidFill>
+                  <a:srgbClr val="808080"/>
+                </a:solidFill>
+                <a:latin typeface="Consolas" panose="020B0609020204030204" pitchFamily="49" charset="0"/>
+              </a:rPr>
+              <a:t>&gt;</a:t>
+            </a:r>
+            <a:endParaRPr lang="da-DK" sz="1400">
+              <a:solidFill>
+                <a:srgbClr val="D4D4D4"/>
+              </a:solidFill>
+              <a:latin typeface="Consolas" panose="020B0609020204030204" pitchFamily="49" charset="0"/>
+            </a:endParaRPr>
+          </a:p>
+          <a:p>
+            <a:pPr defTabSz="360000"/>
+            <a:r>
+              <a:rPr lang="da-DK" sz="1400" smtClean="0">
+                <a:solidFill>
+                  <a:srgbClr val="808080"/>
+                </a:solidFill>
+                <a:latin typeface="Consolas" panose="020B0609020204030204" pitchFamily="49" charset="0"/>
+              </a:rPr>
+              <a:t>			&lt;/</a:t>
+            </a:r>
+            <a:r>
+              <a:rPr lang="da-DK" sz="1400">
+                <a:solidFill>
+                  <a:srgbClr val="569CD6"/>
+                </a:solidFill>
+                <a:latin typeface="Consolas" panose="020B0609020204030204" pitchFamily="49" charset="0"/>
+              </a:rPr>
+              <a:t>div</a:t>
+            </a:r>
+            <a:r>
+              <a:rPr lang="da-DK" sz="1400">
+                <a:solidFill>
+                  <a:srgbClr val="808080"/>
+                </a:solidFill>
+                <a:latin typeface="Consolas" panose="020B0609020204030204" pitchFamily="49" charset="0"/>
+              </a:rPr>
+              <a:t>&gt;</a:t>
+            </a:r>
+            <a:endParaRPr lang="da-DK" sz="1400">
+              <a:solidFill>
+                <a:srgbClr val="D4D4D4"/>
+              </a:solidFill>
+              <a:latin typeface="Consolas" panose="020B0609020204030204" pitchFamily="49" charset="0"/>
+            </a:endParaRPr>
+          </a:p>
+          <a:p>
+            <a:pPr defTabSz="360000"/>
+            <a:r>
+              <a:rPr lang="da-DK" sz="1400" smtClean="0">
+                <a:solidFill>
+                  <a:srgbClr val="D4D4D4"/>
+                </a:solidFill>
+                <a:latin typeface="Consolas" panose="020B0609020204030204" pitchFamily="49" charset="0"/>
+              </a:rPr>
+              <a:t>		);</a:t>
+            </a:r>
+            <a:endParaRPr lang="da-DK" sz="1400">
+              <a:solidFill>
+                <a:srgbClr val="D4D4D4"/>
+              </a:solidFill>
+              <a:latin typeface="Consolas" panose="020B0609020204030204" pitchFamily="49" charset="0"/>
+            </a:endParaRPr>
+          </a:p>
+          <a:p>
+            <a:pPr defTabSz="360000"/>
+            <a:r>
+              <a:rPr lang="da-DK" sz="1400" smtClean="0">
+                <a:solidFill>
+                  <a:srgbClr val="D4D4D4"/>
+                </a:solidFill>
+                <a:latin typeface="Consolas" panose="020B0609020204030204" pitchFamily="49" charset="0"/>
+              </a:rPr>
+              <a:t>	}</a:t>
+            </a:r>
+            <a:endParaRPr lang="da-DK" sz="1400">
+              <a:solidFill>
+                <a:srgbClr val="D4D4D4"/>
+              </a:solidFill>
+              <a:latin typeface="Consolas" panose="020B0609020204030204" pitchFamily="49" charset="0"/>
+            </a:endParaRPr>
+          </a:p>
+          <a:p>
+            <a:pPr defTabSz="360000"/>
+            <a:r>
+              <a:rPr lang="da-DK" sz="1400" smtClean="0">
+                <a:solidFill>
+                  <a:srgbClr val="D4D4D4"/>
+                </a:solidFill>
+                <a:latin typeface="Consolas" panose="020B0609020204030204" pitchFamily="49" charset="0"/>
+              </a:rPr>
+              <a:t>}</a:t>
+            </a:r>
+            <a:endParaRPr lang="da-DK" sz="1400">
+              <a:solidFill>
+                <a:srgbClr val="D4D4D4"/>
+              </a:solidFill>
+              <a:latin typeface="Consolas" panose="020B0609020204030204" pitchFamily="49" charset="0"/>
+            </a:endParaRPr>
+          </a:p>
+        </p:txBody>
+      </p:sp>
+    </p:spTree>
+    <p:extLst>
+      <p:ext uri="{BB962C8B-B14F-4D97-AF65-F5344CB8AC3E}">
+        <p14:creationId xmlns:p14="http://schemas.microsoft.com/office/powerpoint/2010/main" val="3766452343"/>
       </p:ext>
     </p:extLst>
   </p:cSld>
@@ -14630,6 +17046,1471 @@
     <p:extLst>
       <p:ext uri="{BB962C8B-B14F-4D97-AF65-F5344CB8AC3E}">
         <p14:creationId xmlns:p14="http://schemas.microsoft.com/office/powerpoint/2010/main" val="345127587"/>
+      </p:ext>
+    </p:extLst>
+  </p:cSld>
+  <p:clrMapOvr>
+    <a:masterClrMapping/>
+  </p:clrMapOvr>
+  <p:timing>
+    <p:tnLst>
+      <p:par>
+        <p:cTn id="1" dur="indefinite" restart="never" nodeType="tmRoot"/>
+      </p:par>
+    </p:tnLst>
+  </p:timing>
+</p:sld>
+</file>
+
+<file path=ppt/slides/slide40.xml><?xml version="1.0" encoding="utf-8"?>
+<p:sld xmlns:a="http://schemas.openxmlformats.org/drawingml/2006/main" xmlns:r="http://schemas.openxmlformats.org/officeDocument/2006/relationships" xmlns:p="http://schemas.openxmlformats.org/presentationml/2006/main">
+  <p:cSld>
+    <p:spTree>
+      <p:nvGrpSpPr>
+        <p:cNvPr id="1" name=""/>
+        <p:cNvGrpSpPr/>
+        <p:nvPr/>
+      </p:nvGrpSpPr>
+      <p:grpSpPr>
+        <a:xfrm>
+          <a:off x="0" y="0"/>
+          <a:ext cx="0" cy="0"/>
+          <a:chOff x="0" y="0"/>
+          <a:chExt cx="0" cy="0"/>
+        </a:xfrm>
+      </p:grpSpPr>
+      <p:sp>
+        <p:nvSpPr>
+          <p:cNvPr id="2" name="Titel 1"/>
+          <p:cNvSpPr>
+            <a:spLocks noGrp="1"/>
+          </p:cNvSpPr>
+          <p:nvPr>
+            <p:ph type="title"/>
+          </p:nvPr>
+        </p:nvSpPr>
+        <p:spPr/>
+        <p:txBody>
+          <a:bodyPr/>
+          <a:lstStyle/>
+          <a:p>
+            <a:r>
+              <a:rPr lang="da-DK" b="1" smtClean="0"/>
+              <a:t>React – Components</a:t>
+            </a:r>
+            <a:endParaRPr lang="da-DK" b="1"/>
+          </a:p>
+        </p:txBody>
+      </p:sp>
+      <p:sp>
+        <p:nvSpPr>
+          <p:cNvPr id="3" name="Pladsholder til indhold 2"/>
+          <p:cNvSpPr>
+            <a:spLocks noGrp="1"/>
+          </p:cNvSpPr>
+          <p:nvPr>
+            <p:ph idx="1"/>
+          </p:nvPr>
+        </p:nvSpPr>
+        <p:spPr>
+          <a:xfrm>
+            <a:off x="838201" y="1825625"/>
+            <a:ext cx="7039231" cy="4351338"/>
+          </a:xfrm>
+        </p:spPr>
+        <p:txBody>
+          <a:bodyPr>
+            <a:normAutofit/>
+          </a:bodyPr>
+          <a:lstStyle/>
+          <a:p>
+            <a:r>
+              <a:rPr lang="da-DK" sz="3200" smtClean="0"/>
+              <a:t>Note that </a:t>
+            </a:r>
+            <a:r>
+              <a:rPr lang="da-DK" sz="3200" b="1" smtClean="0"/>
+              <a:t>state</a:t>
+            </a:r>
+            <a:r>
+              <a:rPr lang="da-DK" sz="3200" smtClean="0"/>
+              <a:t> in a parent can be used as </a:t>
+            </a:r>
+            <a:r>
+              <a:rPr lang="da-DK" sz="3200" b="1" smtClean="0"/>
+              <a:t>props</a:t>
+            </a:r>
+            <a:r>
+              <a:rPr lang="da-DK" sz="3200" smtClean="0"/>
+              <a:t> to a child</a:t>
+            </a:r>
+          </a:p>
+          <a:p>
+            <a:r>
+              <a:rPr lang="da-DK" sz="3200" smtClean="0"/>
+              <a:t>Very useful – state of parent is updated, and causes children to be updaed as well.</a:t>
+            </a:r>
+            <a:endParaRPr lang="da-DK" sz="3200" smtClean="0"/>
+          </a:p>
+        </p:txBody>
+      </p:sp>
+      <p:pic>
+        <p:nvPicPr>
+          <p:cNvPr id="1026" name="Picture 2" descr="Billedresultat for react logo"/>
+          <p:cNvPicPr>
+            <a:picLocks noChangeAspect="1" noChangeArrowheads="1"/>
+          </p:cNvPicPr>
+          <p:nvPr/>
+        </p:nvPicPr>
+        <p:blipFill>
+          <a:blip r:embed="rId2">
+            <a:extLst>
+              <a:ext uri="{28A0092B-C50C-407E-A947-70E740481C1C}">
+                <a14:useLocalDpi xmlns:a14="http://schemas.microsoft.com/office/drawing/2010/main" val="0"/>
+              </a:ext>
+            </a:extLst>
+          </a:blip>
+          <a:srcRect/>
+          <a:stretch>
+            <a:fillRect/>
+          </a:stretch>
+        </p:blipFill>
+        <p:spPr bwMode="auto">
+          <a:xfrm>
+            <a:off x="8180173" y="840312"/>
+            <a:ext cx="3761689" cy="2656694"/>
+          </a:xfrm>
+          <a:prstGeom prst="rect">
+            <a:avLst/>
+          </a:prstGeom>
+          <a:noFill/>
+          <a:extLst>
+            <a:ext uri="{909E8E84-426E-40DD-AFC4-6F175D3DCCD1}">
+              <a14:hiddenFill xmlns:a14="http://schemas.microsoft.com/office/drawing/2010/main">
+                <a:solidFill>
+                  <a:srgbClr val="FFFFFF"/>
+                </a:solidFill>
+              </a14:hiddenFill>
+            </a:ext>
+          </a:extLst>
+        </p:spPr>
+      </p:pic>
+    </p:spTree>
+    <p:extLst>
+      <p:ext uri="{BB962C8B-B14F-4D97-AF65-F5344CB8AC3E}">
+        <p14:creationId xmlns:p14="http://schemas.microsoft.com/office/powerpoint/2010/main" val="2285004901"/>
+      </p:ext>
+    </p:extLst>
+  </p:cSld>
+  <p:clrMapOvr>
+    <a:masterClrMapping/>
+  </p:clrMapOvr>
+  <p:timing>
+    <p:tnLst>
+      <p:par>
+        <p:cTn id="1" dur="indefinite" restart="never" nodeType="tmRoot"/>
+      </p:par>
+    </p:tnLst>
+  </p:timing>
+</p:sld>
+</file>
+
+<file path=ppt/slides/slide41.xml><?xml version="1.0" encoding="utf-8"?>
+<p:sld xmlns:a="http://schemas.openxmlformats.org/drawingml/2006/main" xmlns:r="http://schemas.openxmlformats.org/officeDocument/2006/relationships" xmlns:p="http://schemas.openxmlformats.org/presentationml/2006/main">
+  <p:cSld>
+    <p:spTree>
+      <p:nvGrpSpPr>
+        <p:cNvPr id="1" name=""/>
+        <p:cNvGrpSpPr/>
+        <p:nvPr/>
+      </p:nvGrpSpPr>
+      <p:grpSpPr>
+        <a:xfrm>
+          <a:off x="0" y="0"/>
+          <a:ext cx="0" cy="0"/>
+          <a:chOff x="0" y="0"/>
+          <a:chExt cx="0" cy="0"/>
+        </a:xfrm>
+      </p:grpSpPr>
+      <p:sp>
+        <p:nvSpPr>
+          <p:cNvPr id="2" name="Titel 1"/>
+          <p:cNvSpPr>
+            <a:spLocks noGrp="1"/>
+          </p:cNvSpPr>
+          <p:nvPr>
+            <p:ph type="title"/>
+          </p:nvPr>
+        </p:nvSpPr>
+        <p:spPr/>
+        <p:txBody>
+          <a:bodyPr/>
+          <a:lstStyle/>
+          <a:p>
+            <a:r>
+              <a:rPr lang="da-DK" b="1" smtClean="0"/>
+              <a:t>React – Components</a:t>
+            </a:r>
+            <a:endParaRPr lang="da-DK" b="1"/>
+          </a:p>
+        </p:txBody>
+      </p:sp>
+      <p:sp>
+        <p:nvSpPr>
+          <p:cNvPr id="3" name="Pladsholder til indhold 2"/>
+          <p:cNvSpPr>
+            <a:spLocks noGrp="1"/>
+          </p:cNvSpPr>
+          <p:nvPr>
+            <p:ph idx="1"/>
+          </p:nvPr>
+        </p:nvSpPr>
+        <p:spPr>
+          <a:xfrm>
+            <a:off x="838201" y="1825625"/>
+            <a:ext cx="7341972" cy="4351338"/>
+          </a:xfrm>
+        </p:spPr>
+        <p:txBody>
+          <a:bodyPr>
+            <a:normAutofit/>
+          </a:bodyPr>
+          <a:lstStyle/>
+          <a:p>
+            <a:r>
+              <a:rPr lang="da-DK" sz="3200" b="1" smtClean="0"/>
+              <a:t>Lifecycle methods</a:t>
+            </a:r>
+          </a:p>
+          <a:p>
+            <a:r>
+              <a:rPr lang="da-DK" sz="3200" smtClean="0"/>
+              <a:t>Methods that are called when specific ”events” happen during the lifecycle of a component instance</a:t>
+            </a:r>
+          </a:p>
+          <a:p>
+            <a:r>
+              <a:rPr lang="da-DK" sz="3200" b="1" smtClean="0"/>
+              <a:t>NB</a:t>
+            </a:r>
+            <a:r>
+              <a:rPr lang="da-DK" sz="3200" smtClean="0"/>
+              <a:t>: it is only the </a:t>
+            </a:r>
+            <a:r>
+              <a:rPr lang="da-DK" sz="3200" b="1" smtClean="0"/>
+              <a:t>render</a:t>
+            </a:r>
+            <a:r>
+              <a:rPr lang="da-DK" sz="3200" smtClean="0"/>
+              <a:t> method which </a:t>
+            </a:r>
+            <a:r>
+              <a:rPr lang="da-DK" sz="3200" u="sng" smtClean="0"/>
+              <a:t>must</a:t>
+            </a:r>
+            <a:r>
+              <a:rPr lang="da-DK" sz="3200" smtClean="0"/>
+              <a:t> be implemented. All other methods are optional</a:t>
+            </a:r>
+          </a:p>
+          <a:p>
+            <a:r>
+              <a:rPr lang="da-DK" sz="3200" smtClean="0"/>
+              <a:t>A bit like </a:t>
+            </a:r>
+            <a:r>
+              <a:rPr lang="da-DK" sz="3200" b="1" smtClean="0"/>
+              <a:t>abstract</a:t>
+            </a:r>
+            <a:r>
+              <a:rPr lang="da-DK" sz="3200" smtClean="0"/>
+              <a:t> and </a:t>
+            </a:r>
+            <a:r>
+              <a:rPr lang="da-DK" sz="3200" b="1" smtClean="0"/>
+              <a:t>virtual</a:t>
+            </a:r>
+            <a:r>
+              <a:rPr lang="da-DK" sz="3200" smtClean="0"/>
+              <a:t> in OO…</a:t>
+            </a:r>
+            <a:endParaRPr lang="da-DK" sz="3200" smtClean="0"/>
+          </a:p>
+        </p:txBody>
+      </p:sp>
+      <p:pic>
+        <p:nvPicPr>
+          <p:cNvPr id="1026" name="Picture 2" descr="Billedresultat for react logo"/>
+          <p:cNvPicPr>
+            <a:picLocks noChangeAspect="1" noChangeArrowheads="1"/>
+          </p:cNvPicPr>
+          <p:nvPr/>
+        </p:nvPicPr>
+        <p:blipFill>
+          <a:blip r:embed="rId2">
+            <a:extLst>
+              <a:ext uri="{28A0092B-C50C-407E-A947-70E740481C1C}">
+                <a14:useLocalDpi xmlns:a14="http://schemas.microsoft.com/office/drawing/2010/main" val="0"/>
+              </a:ext>
+            </a:extLst>
+          </a:blip>
+          <a:srcRect/>
+          <a:stretch>
+            <a:fillRect/>
+          </a:stretch>
+        </p:blipFill>
+        <p:spPr bwMode="auto">
+          <a:xfrm>
+            <a:off x="8180173" y="840312"/>
+            <a:ext cx="3761689" cy="2656694"/>
+          </a:xfrm>
+          <a:prstGeom prst="rect">
+            <a:avLst/>
+          </a:prstGeom>
+          <a:noFill/>
+          <a:extLst>
+            <a:ext uri="{909E8E84-426E-40DD-AFC4-6F175D3DCCD1}">
+              <a14:hiddenFill xmlns:a14="http://schemas.microsoft.com/office/drawing/2010/main">
+                <a:solidFill>
+                  <a:srgbClr val="FFFFFF"/>
+                </a:solidFill>
+              </a14:hiddenFill>
+            </a:ext>
+          </a:extLst>
+        </p:spPr>
+      </p:pic>
+    </p:spTree>
+    <p:extLst>
+      <p:ext uri="{BB962C8B-B14F-4D97-AF65-F5344CB8AC3E}">
+        <p14:creationId xmlns:p14="http://schemas.microsoft.com/office/powerpoint/2010/main" val="4112451015"/>
+      </p:ext>
+    </p:extLst>
+  </p:cSld>
+  <p:clrMapOvr>
+    <a:masterClrMapping/>
+  </p:clrMapOvr>
+  <p:timing>
+    <p:tnLst>
+      <p:par>
+        <p:cTn id="1" dur="indefinite" restart="never" nodeType="tmRoot"/>
+      </p:par>
+    </p:tnLst>
+  </p:timing>
+</p:sld>
+</file>
+
+<file path=ppt/slides/slide42.xml><?xml version="1.0" encoding="utf-8"?>
+<p:sld xmlns:a="http://schemas.openxmlformats.org/drawingml/2006/main" xmlns:r="http://schemas.openxmlformats.org/officeDocument/2006/relationships" xmlns:p="http://schemas.openxmlformats.org/presentationml/2006/main">
+  <p:cSld>
+    <p:spTree>
+      <p:nvGrpSpPr>
+        <p:cNvPr id="1" name=""/>
+        <p:cNvGrpSpPr/>
+        <p:nvPr/>
+      </p:nvGrpSpPr>
+      <p:grpSpPr>
+        <a:xfrm>
+          <a:off x="0" y="0"/>
+          <a:ext cx="0" cy="0"/>
+          <a:chOff x="0" y="0"/>
+          <a:chExt cx="0" cy="0"/>
+        </a:xfrm>
+      </p:grpSpPr>
+      <p:sp>
+        <p:nvSpPr>
+          <p:cNvPr id="2" name="Titel 1"/>
+          <p:cNvSpPr>
+            <a:spLocks noGrp="1"/>
+          </p:cNvSpPr>
+          <p:nvPr>
+            <p:ph type="title"/>
+          </p:nvPr>
+        </p:nvSpPr>
+        <p:spPr/>
+        <p:txBody>
+          <a:bodyPr/>
+          <a:lstStyle/>
+          <a:p>
+            <a:r>
+              <a:rPr lang="da-DK" b="1" smtClean="0"/>
+              <a:t>React – Components</a:t>
+            </a:r>
+            <a:endParaRPr lang="da-DK" b="1"/>
+          </a:p>
+        </p:txBody>
+      </p:sp>
+      <p:sp>
+        <p:nvSpPr>
+          <p:cNvPr id="3" name="Pladsholder til indhold 2"/>
+          <p:cNvSpPr>
+            <a:spLocks noGrp="1"/>
+          </p:cNvSpPr>
+          <p:nvPr>
+            <p:ph idx="1"/>
+          </p:nvPr>
+        </p:nvSpPr>
+        <p:spPr>
+          <a:xfrm>
+            <a:off x="838201" y="1825625"/>
+            <a:ext cx="7039231" cy="4351338"/>
+          </a:xfrm>
+        </p:spPr>
+        <p:txBody>
+          <a:bodyPr>
+            <a:normAutofit/>
+          </a:bodyPr>
+          <a:lstStyle/>
+          <a:p>
+            <a:r>
+              <a:rPr lang="da-DK" sz="3200" smtClean="0"/>
+              <a:t>Lifecycle methods</a:t>
+            </a:r>
+          </a:p>
+          <a:p>
+            <a:pPr lvl="1"/>
+            <a:r>
+              <a:rPr lang="da-DK" sz="2800" b="1" smtClean="0"/>
+              <a:t>constructor</a:t>
+            </a:r>
+          </a:p>
+          <a:p>
+            <a:pPr lvl="1"/>
+            <a:r>
+              <a:rPr lang="da-DK" sz="2800" b="1" smtClean="0"/>
+              <a:t>render</a:t>
+            </a:r>
+          </a:p>
+          <a:p>
+            <a:pPr lvl="1"/>
+            <a:r>
+              <a:rPr lang="da-DK" sz="2800" b="1" smtClean="0"/>
+              <a:t>componentDidMount</a:t>
+            </a:r>
+          </a:p>
+          <a:p>
+            <a:pPr lvl="1"/>
+            <a:r>
+              <a:rPr lang="da-DK" sz="2800" b="1" smtClean="0"/>
+              <a:t>componentDidUpdate</a:t>
+            </a:r>
+          </a:p>
+          <a:p>
+            <a:pPr lvl="1"/>
+            <a:r>
+              <a:rPr lang="da-DK" sz="2800" b="1" smtClean="0"/>
+              <a:t>componentWillUnmount</a:t>
+            </a:r>
+            <a:endParaRPr lang="da-DK" sz="2800" b="1" smtClean="0"/>
+          </a:p>
+        </p:txBody>
+      </p:sp>
+      <p:pic>
+        <p:nvPicPr>
+          <p:cNvPr id="1026" name="Picture 2" descr="Billedresultat for react logo"/>
+          <p:cNvPicPr>
+            <a:picLocks noChangeAspect="1" noChangeArrowheads="1"/>
+          </p:cNvPicPr>
+          <p:nvPr/>
+        </p:nvPicPr>
+        <p:blipFill>
+          <a:blip r:embed="rId2">
+            <a:extLst>
+              <a:ext uri="{28A0092B-C50C-407E-A947-70E740481C1C}">
+                <a14:useLocalDpi xmlns:a14="http://schemas.microsoft.com/office/drawing/2010/main" val="0"/>
+              </a:ext>
+            </a:extLst>
+          </a:blip>
+          <a:srcRect/>
+          <a:stretch>
+            <a:fillRect/>
+          </a:stretch>
+        </p:blipFill>
+        <p:spPr bwMode="auto">
+          <a:xfrm>
+            <a:off x="8180173" y="840312"/>
+            <a:ext cx="3761689" cy="2656694"/>
+          </a:xfrm>
+          <a:prstGeom prst="rect">
+            <a:avLst/>
+          </a:prstGeom>
+          <a:noFill/>
+          <a:extLst>
+            <a:ext uri="{909E8E84-426E-40DD-AFC4-6F175D3DCCD1}">
+              <a14:hiddenFill xmlns:a14="http://schemas.microsoft.com/office/drawing/2010/main">
+                <a:solidFill>
+                  <a:srgbClr val="FFFFFF"/>
+                </a:solidFill>
+              </a14:hiddenFill>
+            </a:ext>
+          </a:extLst>
+        </p:spPr>
+      </p:pic>
+    </p:spTree>
+    <p:extLst>
+      <p:ext uri="{BB962C8B-B14F-4D97-AF65-F5344CB8AC3E}">
+        <p14:creationId xmlns:p14="http://schemas.microsoft.com/office/powerpoint/2010/main" val="3910830974"/>
+      </p:ext>
+    </p:extLst>
+  </p:cSld>
+  <p:clrMapOvr>
+    <a:masterClrMapping/>
+  </p:clrMapOvr>
+  <p:timing>
+    <p:tnLst>
+      <p:par>
+        <p:cTn id="1" dur="indefinite" restart="never" nodeType="tmRoot"/>
+      </p:par>
+    </p:tnLst>
+  </p:timing>
+</p:sld>
+</file>
+
+<file path=ppt/slides/slide43.xml><?xml version="1.0" encoding="utf-8"?>
+<p:sld xmlns:a="http://schemas.openxmlformats.org/drawingml/2006/main" xmlns:r="http://schemas.openxmlformats.org/officeDocument/2006/relationships" xmlns:p="http://schemas.openxmlformats.org/presentationml/2006/main">
+  <p:cSld>
+    <p:spTree>
+      <p:nvGrpSpPr>
+        <p:cNvPr id="1" name=""/>
+        <p:cNvGrpSpPr/>
+        <p:nvPr/>
+      </p:nvGrpSpPr>
+      <p:grpSpPr>
+        <a:xfrm>
+          <a:off x="0" y="0"/>
+          <a:ext cx="0" cy="0"/>
+          <a:chOff x="0" y="0"/>
+          <a:chExt cx="0" cy="0"/>
+        </a:xfrm>
+      </p:grpSpPr>
+      <p:sp>
+        <p:nvSpPr>
+          <p:cNvPr id="2" name="Titel 1"/>
+          <p:cNvSpPr>
+            <a:spLocks noGrp="1"/>
+          </p:cNvSpPr>
+          <p:nvPr>
+            <p:ph type="title"/>
+          </p:nvPr>
+        </p:nvSpPr>
+        <p:spPr/>
+        <p:txBody>
+          <a:bodyPr/>
+          <a:lstStyle/>
+          <a:p>
+            <a:r>
+              <a:rPr lang="da-DK" b="1"/>
+              <a:t>React – Components</a:t>
+            </a:r>
+            <a:endParaRPr lang="da-DK"/>
+          </a:p>
+        </p:txBody>
+      </p:sp>
+      <p:graphicFrame>
+        <p:nvGraphicFramePr>
+          <p:cNvPr id="4" name="Tabel 3"/>
+          <p:cNvGraphicFramePr>
+            <a:graphicFrameLocks noGrp="1"/>
+          </p:cNvGraphicFramePr>
+          <p:nvPr>
+            <p:extLst>
+              <p:ext uri="{D42A27DB-BD31-4B8C-83A1-F6EECF244321}">
+                <p14:modId xmlns:p14="http://schemas.microsoft.com/office/powerpoint/2010/main" val="3732728964"/>
+              </p:ext>
+            </p:extLst>
+          </p:nvPr>
+        </p:nvGraphicFramePr>
+        <p:xfrm>
+          <a:off x="1024924" y="2344579"/>
+          <a:ext cx="10269151" cy="2311400"/>
+        </p:xfrm>
+        <a:graphic>
+          <a:graphicData uri="http://schemas.openxmlformats.org/drawingml/2006/table">
+            <a:tbl>
+              <a:tblPr firstRow="1" bandRow="1">
+                <a:tableStyleId>{5940675A-B579-460E-94D1-54222C63F5DA}</a:tableStyleId>
+              </a:tblPr>
+              <a:tblGrid>
+                <a:gridCol w="2700638">
+                  <a:extLst>
+                    <a:ext uri="{9D8B030D-6E8A-4147-A177-3AD203B41FA5}">
+                      <a16:colId xmlns:a16="http://schemas.microsoft.com/office/drawing/2014/main" val="1849526099"/>
+                    </a:ext>
+                  </a:extLst>
+                </a:gridCol>
+                <a:gridCol w="5090984">
+                  <a:extLst>
+                    <a:ext uri="{9D8B030D-6E8A-4147-A177-3AD203B41FA5}">
+                      <a16:colId xmlns:a16="http://schemas.microsoft.com/office/drawing/2014/main" val="605699329"/>
+                    </a:ext>
+                  </a:extLst>
+                </a:gridCol>
+                <a:gridCol w="2477529">
+                  <a:extLst>
+                    <a:ext uri="{9D8B030D-6E8A-4147-A177-3AD203B41FA5}">
+                      <a16:colId xmlns:a16="http://schemas.microsoft.com/office/drawing/2014/main" val="2251638936"/>
+                    </a:ext>
+                  </a:extLst>
+                </a:gridCol>
+              </a:tblGrid>
+              <a:tr h="370840">
+                <a:tc>
+                  <a:txBody>
+                    <a:bodyPr/>
+                    <a:lstStyle/>
+                    <a:p>
+                      <a:r>
+                        <a:rPr lang="da-DK" sz="2400" b="1" smtClean="0">
+                          <a:solidFill>
+                            <a:srgbClr val="FF0000"/>
+                          </a:solidFill>
+                        </a:rPr>
+                        <a:t>Function</a:t>
+                      </a:r>
+                      <a:endParaRPr lang="da-DK" sz="2400" b="1">
+                        <a:solidFill>
+                          <a:srgbClr val="FF0000"/>
+                        </a:solidFill>
+                      </a:endParaRPr>
+                    </a:p>
+                  </a:txBody>
+                  <a:tcPr/>
+                </a:tc>
+                <a:tc>
+                  <a:txBody>
+                    <a:bodyPr/>
+                    <a:lstStyle/>
+                    <a:p>
+                      <a:r>
+                        <a:rPr lang="da-DK" sz="2400" b="1" smtClean="0">
+                          <a:solidFill>
+                            <a:srgbClr val="FF0000"/>
+                          </a:solidFill>
+                        </a:rPr>
+                        <a:t>When</a:t>
+                      </a:r>
+                      <a:endParaRPr lang="da-DK" sz="2400" b="1">
+                        <a:solidFill>
+                          <a:srgbClr val="FF0000"/>
+                        </a:solidFill>
+                      </a:endParaRPr>
+                    </a:p>
+                  </a:txBody>
+                  <a:tcPr/>
+                </a:tc>
+                <a:tc>
+                  <a:txBody>
+                    <a:bodyPr/>
+                    <a:lstStyle/>
+                    <a:p>
+                      <a:r>
+                        <a:rPr lang="da-DK" sz="2400" b="1" smtClean="0">
+                          <a:solidFill>
+                            <a:srgbClr val="FF0000"/>
+                          </a:solidFill>
+                        </a:rPr>
+                        <a:t>How often</a:t>
+                      </a:r>
+                      <a:endParaRPr lang="da-DK" sz="2400" b="1">
+                        <a:solidFill>
+                          <a:srgbClr val="FF0000"/>
+                        </a:solidFill>
+                      </a:endParaRPr>
+                    </a:p>
+                  </a:txBody>
+                  <a:tcPr/>
+                </a:tc>
+                <a:extLst>
+                  <a:ext uri="{0D108BD9-81ED-4DB2-BD59-A6C34878D82A}">
+                    <a16:rowId xmlns:a16="http://schemas.microsoft.com/office/drawing/2014/main" val="4185483210"/>
+                  </a:ext>
+                </a:extLst>
+              </a:tr>
+              <a:tr h="370840">
+                <a:tc>
+                  <a:txBody>
+                    <a:bodyPr/>
+                    <a:lstStyle/>
+                    <a:p>
+                      <a:r>
+                        <a:rPr lang="da-DK" sz="1600" b="1" smtClean="0"/>
+                        <a:t>constructor</a:t>
+                      </a:r>
+                      <a:endParaRPr lang="da-DK" sz="1600" b="1"/>
+                    </a:p>
+                  </a:txBody>
+                  <a:tcPr/>
+                </a:tc>
+                <a:tc>
+                  <a:txBody>
+                    <a:bodyPr/>
+                    <a:lstStyle/>
+                    <a:p>
+                      <a:r>
+                        <a:rPr lang="da-DK" sz="1600" smtClean="0"/>
+                        <a:t>component instance is being created</a:t>
+                      </a:r>
+                      <a:endParaRPr lang="da-DK" sz="1600"/>
+                    </a:p>
+                  </a:txBody>
+                  <a:tcPr/>
+                </a:tc>
+                <a:tc>
+                  <a:txBody>
+                    <a:bodyPr/>
+                    <a:lstStyle/>
+                    <a:p>
+                      <a:r>
+                        <a:rPr lang="da-DK" sz="1600" smtClean="0"/>
+                        <a:t>once</a:t>
+                      </a:r>
+                      <a:endParaRPr lang="da-DK" sz="1600"/>
+                    </a:p>
+                  </a:txBody>
+                  <a:tcPr/>
+                </a:tc>
+                <a:extLst>
+                  <a:ext uri="{0D108BD9-81ED-4DB2-BD59-A6C34878D82A}">
+                    <a16:rowId xmlns:a16="http://schemas.microsoft.com/office/drawing/2014/main" val="3208461575"/>
+                  </a:ext>
+                </a:extLst>
+              </a:tr>
+              <a:tr h="370840">
+                <a:tc>
+                  <a:txBody>
+                    <a:bodyPr/>
+                    <a:lstStyle/>
+                    <a:p>
+                      <a:r>
+                        <a:rPr lang="da-DK" sz="1600" b="1" smtClean="0"/>
+                        <a:t>render</a:t>
+                      </a:r>
+                      <a:endParaRPr lang="da-DK" sz="1600" b="1"/>
+                    </a:p>
+                  </a:txBody>
+                  <a:tcPr/>
+                </a:tc>
+                <a:tc>
+                  <a:txBody>
+                    <a:bodyPr/>
+                    <a:lstStyle/>
+                    <a:p>
+                      <a:r>
+                        <a:rPr lang="da-DK" sz="1600" smtClean="0"/>
+                        <a:t>when</a:t>
+                      </a:r>
+                      <a:r>
+                        <a:rPr lang="da-DK" sz="1600" baseline="0" smtClean="0"/>
+                        <a:t> content needs to be (re-)rendered</a:t>
+                      </a:r>
+                      <a:endParaRPr lang="da-DK" sz="1600"/>
+                    </a:p>
+                  </a:txBody>
+                  <a:tcPr/>
+                </a:tc>
+                <a:tc>
+                  <a:txBody>
+                    <a:bodyPr/>
+                    <a:lstStyle/>
+                    <a:p>
+                      <a:r>
+                        <a:rPr lang="da-DK" sz="1600" i="1" smtClean="0"/>
+                        <a:t>many</a:t>
+                      </a:r>
+                      <a:endParaRPr lang="da-DK" sz="1600" i="1"/>
+                    </a:p>
+                  </a:txBody>
+                  <a:tcPr/>
+                </a:tc>
+                <a:extLst>
+                  <a:ext uri="{0D108BD9-81ED-4DB2-BD59-A6C34878D82A}">
+                    <a16:rowId xmlns:a16="http://schemas.microsoft.com/office/drawing/2014/main" val="1055981159"/>
+                  </a:ext>
+                </a:extLst>
+              </a:tr>
+              <a:tr h="370840">
+                <a:tc>
+                  <a:txBody>
+                    <a:bodyPr/>
+                    <a:lstStyle/>
+                    <a:p>
+                      <a:r>
+                        <a:rPr lang="da-DK" sz="1600" b="1" smtClean="0"/>
+                        <a:t>componentDidMount</a:t>
+                      </a:r>
+                      <a:endParaRPr lang="da-DK" sz="1600" b="1"/>
+                    </a:p>
+                  </a:txBody>
+                  <a:tcPr/>
+                </a:tc>
+                <a:tc>
+                  <a:txBody>
+                    <a:bodyPr/>
+                    <a:lstStyle/>
+                    <a:p>
+                      <a:r>
+                        <a:rPr lang="da-DK" sz="1600" smtClean="0"/>
+                        <a:t>when content is visible</a:t>
+                      </a:r>
+                      <a:r>
+                        <a:rPr lang="da-DK" sz="1600" baseline="0" smtClean="0"/>
+                        <a:t> on screen</a:t>
+                      </a:r>
+                      <a:endParaRPr lang="da-DK" sz="1600"/>
+                    </a:p>
+                  </a:txBody>
+                  <a:tcPr/>
+                </a:tc>
+                <a:tc>
+                  <a:txBody>
+                    <a:bodyPr/>
+                    <a:lstStyle/>
+                    <a:p>
+                      <a:r>
+                        <a:rPr lang="da-DK" sz="1600" smtClean="0"/>
+                        <a:t>once</a:t>
+                      </a:r>
+                      <a:endParaRPr lang="da-DK" sz="1600"/>
+                    </a:p>
+                  </a:txBody>
+                  <a:tcPr/>
+                </a:tc>
+                <a:extLst>
+                  <a:ext uri="{0D108BD9-81ED-4DB2-BD59-A6C34878D82A}">
+                    <a16:rowId xmlns:a16="http://schemas.microsoft.com/office/drawing/2014/main" val="4176557327"/>
+                  </a:ext>
+                </a:extLst>
+              </a:tr>
+              <a:tr h="370840">
+                <a:tc>
+                  <a:txBody>
+                    <a:bodyPr/>
+                    <a:lstStyle/>
+                    <a:p>
+                      <a:r>
+                        <a:rPr lang="da-DK" sz="1600" b="1" smtClean="0"/>
+                        <a:t>componentDidUpdate</a:t>
+                      </a:r>
+                      <a:endParaRPr lang="da-DK" sz="1600" b="1"/>
+                    </a:p>
+                  </a:txBody>
+                  <a:tcPr/>
+                </a:tc>
+                <a:tc>
+                  <a:txBody>
+                    <a:bodyPr/>
+                    <a:lstStyle/>
+                    <a:p>
+                      <a:r>
+                        <a:rPr lang="da-DK" sz="1600" smtClean="0"/>
+                        <a:t>whenever the component updates itself</a:t>
+                      </a:r>
+                      <a:endParaRPr lang="da-DK" sz="1600"/>
+                    </a:p>
+                  </a:txBody>
+                  <a:tcPr/>
+                </a:tc>
+                <a:tc>
+                  <a:txBody>
+                    <a:bodyPr/>
+                    <a:lstStyle/>
+                    <a:p>
+                      <a:r>
+                        <a:rPr lang="da-DK" sz="1600" i="1" smtClean="0"/>
+                        <a:t>many</a:t>
+                      </a:r>
+                      <a:endParaRPr lang="da-DK" sz="1600" i="1"/>
+                    </a:p>
+                  </a:txBody>
+                  <a:tcPr/>
+                </a:tc>
+                <a:extLst>
+                  <a:ext uri="{0D108BD9-81ED-4DB2-BD59-A6C34878D82A}">
+                    <a16:rowId xmlns:a16="http://schemas.microsoft.com/office/drawing/2014/main" val="2487168664"/>
+                  </a:ext>
+                </a:extLst>
+              </a:tr>
+              <a:tr h="370840">
+                <a:tc>
+                  <a:txBody>
+                    <a:bodyPr/>
+                    <a:lstStyle/>
+                    <a:p>
+                      <a:r>
+                        <a:rPr lang="da-DK" sz="1600" b="1" smtClean="0"/>
+                        <a:t>componentWillUnmount</a:t>
+                      </a:r>
+                      <a:endParaRPr lang="da-DK" sz="1600" b="1"/>
+                    </a:p>
+                  </a:txBody>
+                  <a:tcPr/>
+                </a:tc>
+                <a:tc>
+                  <a:txBody>
+                    <a:bodyPr/>
+                    <a:lstStyle/>
+                    <a:p>
+                      <a:pPr marL="0" marR="0" lvl="0" indent="0" algn="l" defTabSz="914400" rtl="0" eaLnBrk="1" fontAlgn="auto" latinLnBrk="0" hangingPunct="1">
+                        <a:lnSpc>
+                          <a:spcPct val="100000"/>
+                        </a:lnSpc>
+                        <a:spcBef>
+                          <a:spcPts val="0"/>
+                        </a:spcBef>
+                        <a:spcAft>
+                          <a:spcPts val="0"/>
+                        </a:spcAft>
+                        <a:buClrTx/>
+                        <a:buSzTx/>
+                        <a:buFontTx/>
+                        <a:buNone/>
+                        <a:tabLst/>
+                        <a:defRPr/>
+                      </a:pPr>
+                      <a:r>
+                        <a:rPr lang="da-DK" sz="1600" smtClean="0"/>
+                        <a:t>when content is no longer visible</a:t>
+                      </a:r>
+                      <a:r>
+                        <a:rPr lang="da-DK" sz="1600" baseline="0" smtClean="0"/>
+                        <a:t> on screen</a:t>
+                      </a:r>
+                      <a:endParaRPr lang="da-DK" sz="1600" smtClean="0"/>
+                    </a:p>
+                  </a:txBody>
+                  <a:tcPr/>
+                </a:tc>
+                <a:tc>
+                  <a:txBody>
+                    <a:bodyPr/>
+                    <a:lstStyle/>
+                    <a:p>
+                      <a:r>
+                        <a:rPr lang="da-DK" sz="1600" smtClean="0"/>
+                        <a:t>once</a:t>
+                      </a:r>
+                      <a:endParaRPr lang="da-DK" sz="1600"/>
+                    </a:p>
+                  </a:txBody>
+                  <a:tcPr/>
+                </a:tc>
+                <a:extLst>
+                  <a:ext uri="{0D108BD9-81ED-4DB2-BD59-A6C34878D82A}">
+                    <a16:rowId xmlns:a16="http://schemas.microsoft.com/office/drawing/2014/main" val="2493779166"/>
+                  </a:ext>
+                </a:extLst>
+              </a:tr>
+            </a:tbl>
+          </a:graphicData>
+        </a:graphic>
+      </p:graphicFrame>
+    </p:spTree>
+    <p:extLst>
+      <p:ext uri="{BB962C8B-B14F-4D97-AF65-F5344CB8AC3E}">
+        <p14:creationId xmlns:p14="http://schemas.microsoft.com/office/powerpoint/2010/main" val="1959172454"/>
+      </p:ext>
+    </p:extLst>
+  </p:cSld>
+  <p:clrMapOvr>
+    <a:masterClrMapping/>
+  </p:clrMapOvr>
+</p:sld>
+</file>
+
+<file path=ppt/slides/slide44.xml><?xml version="1.0" encoding="utf-8"?>
+<p:sld xmlns:a="http://schemas.openxmlformats.org/drawingml/2006/main" xmlns:r="http://schemas.openxmlformats.org/officeDocument/2006/relationships" xmlns:p="http://schemas.openxmlformats.org/presentationml/2006/main">
+  <p:cSld>
+    <p:spTree>
+      <p:nvGrpSpPr>
+        <p:cNvPr id="1" name=""/>
+        <p:cNvGrpSpPr/>
+        <p:nvPr/>
+      </p:nvGrpSpPr>
+      <p:grpSpPr>
+        <a:xfrm>
+          <a:off x="0" y="0"/>
+          <a:ext cx="0" cy="0"/>
+          <a:chOff x="0" y="0"/>
+          <a:chExt cx="0" cy="0"/>
+        </a:xfrm>
+      </p:grpSpPr>
+      <p:sp>
+        <p:nvSpPr>
+          <p:cNvPr id="2" name="Titel 1"/>
+          <p:cNvSpPr>
+            <a:spLocks noGrp="1"/>
+          </p:cNvSpPr>
+          <p:nvPr>
+            <p:ph type="title"/>
+          </p:nvPr>
+        </p:nvSpPr>
+        <p:spPr/>
+        <p:txBody>
+          <a:bodyPr/>
+          <a:lstStyle/>
+          <a:p>
+            <a:r>
+              <a:rPr lang="da-DK" b="1"/>
+              <a:t>React – Components</a:t>
+            </a:r>
+            <a:endParaRPr lang="da-DK"/>
+          </a:p>
+        </p:txBody>
+      </p:sp>
+      <p:graphicFrame>
+        <p:nvGraphicFramePr>
+          <p:cNvPr id="4" name="Tabel 3"/>
+          <p:cNvGraphicFramePr>
+            <a:graphicFrameLocks noGrp="1"/>
+          </p:cNvGraphicFramePr>
+          <p:nvPr>
+            <p:extLst>
+              <p:ext uri="{D42A27DB-BD31-4B8C-83A1-F6EECF244321}">
+                <p14:modId xmlns:p14="http://schemas.microsoft.com/office/powerpoint/2010/main" val="2753191180"/>
+              </p:ext>
+            </p:extLst>
+          </p:nvPr>
+        </p:nvGraphicFramePr>
+        <p:xfrm>
+          <a:off x="1024924" y="2344579"/>
+          <a:ext cx="10170298" cy="2311400"/>
+        </p:xfrm>
+        <a:graphic>
+          <a:graphicData uri="http://schemas.openxmlformats.org/drawingml/2006/table">
+            <a:tbl>
+              <a:tblPr firstRow="1" bandRow="1">
+                <a:tableStyleId>{5940675A-B579-460E-94D1-54222C63F5DA}</a:tableStyleId>
+              </a:tblPr>
+              <a:tblGrid>
+                <a:gridCol w="3525106">
+                  <a:extLst>
+                    <a:ext uri="{9D8B030D-6E8A-4147-A177-3AD203B41FA5}">
+                      <a16:colId xmlns:a16="http://schemas.microsoft.com/office/drawing/2014/main" val="1849526099"/>
+                    </a:ext>
+                  </a:extLst>
+                </a:gridCol>
+                <a:gridCol w="6645192">
+                  <a:extLst>
+                    <a:ext uri="{9D8B030D-6E8A-4147-A177-3AD203B41FA5}">
+                      <a16:colId xmlns:a16="http://schemas.microsoft.com/office/drawing/2014/main" val="605699329"/>
+                    </a:ext>
+                  </a:extLst>
+                </a:gridCol>
+              </a:tblGrid>
+              <a:tr h="370840">
+                <a:tc>
+                  <a:txBody>
+                    <a:bodyPr/>
+                    <a:lstStyle/>
+                    <a:p>
+                      <a:r>
+                        <a:rPr lang="da-DK" sz="2400" b="1" smtClean="0">
+                          <a:solidFill>
+                            <a:srgbClr val="FF0000"/>
+                          </a:solidFill>
+                        </a:rPr>
+                        <a:t>Function</a:t>
+                      </a:r>
+                      <a:endParaRPr lang="da-DK" sz="2400" b="1">
+                        <a:solidFill>
+                          <a:srgbClr val="FF0000"/>
+                        </a:solidFill>
+                      </a:endParaRPr>
+                    </a:p>
+                  </a:txBody>
+                  <a:tcPr/>
+                </a:tc>
+                <a:tc>
+                  <a:txBody>
+                    <a:bodyPr/>
+                    <a:lstStyle/>
+                    <a:p>
+                      <a:r>
+                        <a:rPr lang="da-DK" sz="2400" b="1" smtClean="0">
+                          <a:solidFill>
+                            <a:srgbClr val="FF0000"/>
+                          </a:solidFill>
+                        </a:rPr>
+                        <a:t>What to do…</a:t>
+                      </a:r>
+                      <a:endParaRPr lang="da-DK" sz="2400" b="1">
+                        <a:solidFill>
+                          <a:srgbClr val="FF0000"/>
+                        </a:solidFill>
+                      </a:endParaRPr>
+                    </a:p>
+                  </a:txBody>
+                  <a:tcPr/>
+                </a:tc>
+                <a:extLst>
+                  <a:ext uri="{0D108BD9-81ED-4DB2-BD59-A6C34878D82A}">
+                    <a16:rowId xmlns:a16="http://schemas.microsoft.com/office/drawing/2014/main" val="4185483210"/>
+                  </a:ext>
+                </a:extLst>
+              </a:tr>
+              <a:tr h="370840">
+                <a:tc>
+                  <a:txBody>
+                    <a:bodyPr/>
+                    <a:lstStyle/>
+                    <a:p>
+                      <a:r>
+                        <a:rPr lang="da-DK" sz="1600" b="1" smtClean="0"/>
+                        <a:t>constructor</a:t>
+                      </a:r>
+                      <a:endParaRPr lang="da-DK" sz="1600" b="1"/>
+                    </a:p>
+                  </a:txBody>
+                  <a:tcPr/>
+                </a:tc>
+                <a:tc>
+                  <a:txBody>
+                    <a:bodyPr/>
+                    <a:lstStyle/>
+                    <a:p>
+                      <a:r>
+                        <a:rPr lang="da-DK" sz="1600" smtClean="0"/>
+                        <a:t>one-time initialisation (could include </a:t>
+                      </a:r>
+                      <a:r>
+                        <a:rPr lang="da-DK" sz="1600" b="1" smtClean="0"/>
+                        <a:t>state</a:t>
+                      </a:r>
+                      <a:r>
+                        <a:rPr lang="da-DK" sz="1600" smtClean="0"/>
+                        <a:t>), usually </a:t>
+                      </a:r>
+                      <a:r>
+                        <a:rPr lang="da-DK" sz="1600" u="sng" smtClean="0"/>
+                        <a:t>not</a:t>
+                      </a:r>
+                      <a:r>
+                        <a:rPr lang="da-DK" sz="1600" smtClean="0"/>
+                        <a:t> data loading</a:t>
+                      </a:r>
+                      <a:endParaRPr lang="da-DK" sz="1600"/>
+                    </a:p>
+                  </a:txBody>
+                  <a:tcPr/>
+                </a:tc>
+                <a:extLst>
+                  <a:ext uri="{0D108BD9-81ED-4DB2-BD59-A6C34878D82A}">
+                    <a16:rowId xmlns:a16="http://schemas.microsoft.com/office/drawing/2014/main" val="3208461575"/>
+                  </a:ext>
+                </a:extLst>
+              </a:tr>
+              <a:tr h="370840">
+                <a:tc>
+                  <a:txBody>
+                    <a:bodyPr/>
+                    <a:lstStyle/>
+                    <a:p>
+                      <a:r>
+                        <a:rPr lang="da-DK" sz="1600" b="1" smtClean="0"/>
+                        <a:t>render</a:t>
+                      </a:r>
+                      <a:endParaRPr lang="da-DK" sz="1600" b="1"/>
+                    </a:p>
+                  </a:txBody>
+                  <a:tcPr/>
+                </a:tc>
+                <a:tc>
+                  <a:txBody>
+                    <a:bodyPr/>
+                    <a:lstStyle/>
+                    <a:p>
+                      <a:r>
+                        <a:rPr lang="da-DK" sz="1600" smtClean="0"/>
+                        <a:t>content</a:t>
+                      </a:r>
+                      <a:r>
+                        <a:rPr lang="da-DK" sz="1600" baseline="0" smtClean="0"/>
+                        <a:t> generation (preferably </a:t>
+                      </a:r>
+                      <a:r>
+                        <a:rPr lang="da-DK" sz="1600" u="sng" baseline="0" smtClean="0"/>
+                        <a:t>only</a:t>
+                      </a:r>
+                      <a:r>
+                        <a:rPr lang="da-DK" sz="1600" baseline="0" smtClean="0"/>
+                        <a:t> this)</a:t>
+                      </a:r>
+                      <a:endParaRPr lang="da-DK" sz="1600"/>
+                    </a:p>
+                  </a:txBody>
+                  <a:tcPr/>
+                </a:tc>
+                <a:extLst>
+                  <a:ext uri="{0D108BD9-81ED-4DB2-BD59-A6C34878D82A}">
+                    <a16:rowId xmlns:a16="http://schemas.microsoft.com/office/drawing/2014/main" val="1055981159"/>
+                  </a:ext>
+                </a:extLst>
+              </a:tr>
+              <a:tr h="370840">
+                <a:tc>
+                  <a:txBody>
+                    <a:bodyPr/>
+                    <a:lstStyle/>
+                    <a:p>
+                      <a:r>
+                        <a:rPr lang="da-DK" sz="1600" b="1" smtClean="0"/>
+                        <a:t>componentDidMount</a:t>
+                      </a:r>
+                      <a:endParaRPr lang="da-DK" sz="1600" b="1"/>
+                    </a:p>
+                  </a:txBody>
+                  <a:tcPr/>
+                </a:tc>
+                <a:tc>
+                  <a:txBody>
+                    <a:bodyPr/>
+                    <a:lstStyle/>
+                    <a:p>
+                      <a:r>
+                        <a:rPr lang="da-DK" sz="1600" smtClean="0"/>
+                        <a:t>one-time data loading</a:t>
+                      </a:r>
+                      <a:endParaRPr lang="da-DK" sz="1600"/>
+                    </a:p>
+                  </a:txBody>
+                  <a:tcPr/>
+                </a:tc>
+                <a:extLst>
+                  <a:ext uri="{0D108BD9-81ED-4DB2-BD59-A6C34878D82A}">
+                    <a16:rowId xmlns:a16="http://schemas.microsoft.com/office/drawing/2014/main" val="4176557327"/>
+                  </a:ext>
+                </a:extLst>
+              </a:tr>
+              <a:tr h="370840">
+                <a:tc>
+                  <a:txBody>
+                    <a:bodyPr/>
+                    <a:lstStyle/>
+                    <a:p>
+                      <a:r>
+                        <a:rPr lang="da-DK" sz="1600" b="1" smtClean="0"/>
+                        <a:t>componentDidUpdate</a:t>
+                      </a:r>
+                      <a:endParaRPr lang="da-DK" sz="1600" b="1"/>
+                    </a:p>
+                  </a:txBody>
+                  <a:tcPr/>
+                </a:tc>
+                <a:tc>
+                  <a:txBody>
+                    <a:bodyPr/>
+                    <a:lstStyle/>
+                    <a:p>
+                      <a:r>
+                        <a:rPr lang="da-DK" sz="1600" smtClean="0"/>
+                        <a:t>more data loading, e.g. when </a:t>
+                      </a:r>
+                      <a:r>
+                        <a:rPr lang="da-DK" sz="1600" b="1" smtClean="0"/>
+                        <a:t>state</a:t>
+                      </a:r>
+                      <a:r>
+                        <a:rPr lang="da-DK" sz="1600" smtClean="0"/>
+                        <a:t> changes</a:t>
+                      </a:r>
+                      <a:endParaRPr lang="da-DK" sz="1600"/>
+                    </a:p>
+                  </a:txBody>
+                  <a:tcPr/>
+                </a:tc>
+                <a:extLst>
+                  <a:ext uri="{0D108BD9-81ED-4DB2-BD59-A6C34878D82A}">
+                    <a16:rowId xmlns:a16="http://schemas.microsoft.com/office/drawing/2014/main" val="2487168664"/>
+                  </a:ext>
+                </a:extLst>
+              </a:tr>
+              <a:tr h="370840">
+                <a:tc>
+                  <a:txBody>
+                    <a:bodyPr/>
+                    <a:lstStyle/>
+                    <a:p>
+                      <a:r>
+                        <a:rPr lang="da-DK" sz="1600" b="1" smtClean="0"/>
+                        <a:t>componentWillUnmount</a:t>
+                      </a:r>
+                      <a:endParaRPr lang="da-DK" sz="1600" b="1"/>
+                    </a:p>
+                  </a:txBody>
+                  <a:tcPr/>
+                </a:tc>
+                <a:tc>
+                  <a:txBody>
+                    <a:bodyPr/>
+                    <a:lstStyle/>
+                    <a:p>
+                      <a:pPr marL="0" marR="0" lvl="0" indent="0" algn="l" defTabSz="914400" rtl="0" eaLnBrk="1" fontAlgn="auto" latinLnBrk="0" hangingPunct="1">
+                        <a:lnSpc>
+                          <a:spcPct val="100000"/>
+                        </a:lnSpc>
+                        <a:spcBef>
+                          <a:spcPts val="0"/>
+                        </a:spcBef>
+                        <a:spcAft>
+                          <a:spcPts val="0"/>
+                        </a:spcAft>
+                        <a:buClrTx/>
+                        <a:buSzTx/>
+                        <a:buFontTx/>
+                        <a:buNone/>
+                        <a:tabLst/>
+                        <a:defRPr/>
+                      </a:pPr>
+                      <a:r>
+                        <a:rPr lang="da-DK" sz="1600" smtClean="0"/>
+                        <a:t>one-time cleanup of resources, if needed</a:t>
+                      </a:r>
+                    </a:p>
+                  </a:txBody>
+                  <a:tcPr/>
+                </a:tc>
+                <a:extLst>
+                  <a:ext uri="{0D108BD9-81ED-4DB2-BD59-A6C34878D82A}">
+                    <a16:rowId xmlns:a16="http://schemas.microsoft.com/office/drawing/2014/main" val="2493779166"/>
+                  </a:ext>
+                </a:extLst>
+              </a:tr>
+            </a:tbl>
+          </a:graphicData>
+        </a:graphic>
+      </p:graphicFrame>
+    </p:spTree>
+    <p:extLst>
+      <p:ext uri="{BB962C8B-B14F-4D97-AF65-F5344CB8AC3E}">
+        <p14:creationId xmlns:p14="http://schemas.microsoft.com/office/powerpoint/2010/main" val="1350605355"/>
+      </p:ext>
+    </p:extLst>
+  </p:cSld>
+  <p:clrMapOvr>
+    <a:masterClrMapping/>
+  </p:clrMapOvr>
+</p:sld>
+</file>
+
+<file path=ppt/slides/slide45.xml><?xml version="1.0" encoding="utf-8"?>
+<p:sld xmlns:a="http://schemas.openxmlformats.org/drawingml/2006/main" xmlns:r="http://schemas.openxmlformats.org/officeDocument/2006/relationships" xmlns:p="http://schemas.openxmlformats.org/presentationml/2006/main">
+  <p:cSld>
+    <p:spTree>
+      <p:nvGrpSpPr>
+        <p:cNvPr id="1" name=""/>
+        <p:cNvGrpSpPr/>
+        <p:nvPr/>
+      </p:nvGrpSpPr>
+      <p:grpSpPr>
+        <a:xfrm>
+          <a:off x="0" y="0"/>
+          <a:ext cx="0" cy="0"/>
+          <a:chOff x="0" y="0"/>
+          <a:chExt cx="0" cy="0"/>
+        </a:xfrm>
+      </p:grpSpPr>
+      <p:sp>
+        <p:nvSpPr>
+          <p:cNvPr id="2" name="Titel 1"/>
+          <p:cNvSpPr>
+            <a:spLocks noGrp="1"/>
+          </p:cNvSpPr>
+          <p:nvPr>
+            <p:ph type="title"/>
+          </p:nvPr>
+        </p:nvSpPr>
+        <p:spPr/>
+        <p:txBody>
+          <a:bodyPr/>
+          <a:lstStyle/>
+          <a:p>
+            <a:r>
+              <a:rPr lang="da-DK" b="1" smtClean="0"/>
+              <a:t>React – </a:t>
+            </a:r>
+            <a:r>
+              <a:rPr lang="da-DK" b="1" smtClean="0"/>
+              <a:t>UI and Events</a:t>
+            </a:r>
+            <a:endParaRPr lang="da-DK" b="1"/>
+          </a:p>
+        </p:txBody>
+      </p:sp>
+      <p:sp>
+        <p:nvSpPr>
+          <p:cNvPr id="3" name="Pladsholder til indhold 2"/>
+          <p:cNvSpPr>
+            <a:spLocks noGrp="1"/>
+          </p:cNvSpPr>
+          <p:nvPr>
+            <p:ph idx="1"/>
+          </p:nvPr>
+        </p:nvSpPr>
+        <p:spPr>
+          <a:xfrm>
+            <a:off x="838201" y="1825625"/>
+            <a:ext cx="7039231" cy="4351338"/>
+          </a:xfrm>
+        </p:spPr>
+        <p:txBody>
+          <a:bodyPr>
+            <a:normAutofit/>
+          </a:bodyPr>
+          <a:lstStyle/>
+          <a:p>
+            <a:r>
+              <a:rPr lang="da-DK" sz="3200" smtClean="0"/>
+              <a:t>Still to come…</a:t>
+            </a:r>
+            <a:endParaRPr lang="da-DK" sz="2800" b="1" smtClean="0"/>
+          </a:p>
+        </p:txBody>
+      </p:sp>
+      <p:pic>
+        <p:nvPicPr>
+          <p:cNvPr id="1026" name="Picture 2" descr="Billedresultat for react logo"/>
+          <p:cNvPicPr>
+            <a:picLocks noChangeAspect="1" noChangeArrowheads="1"/>
+          </p:cNvPicPr>
+          <p:nvPr/>
+        </p:nvPicPr>
+        <p:blipFill>
+          <a:blip r:embed="rId2">
+            <a:extLst>
+              <a:ext uri="{28A0092B-C50C-407E-A947-70E740481C1C}">
+                <a14:useLocalDpi xmlns:a14="http://schemas.microsoft.com/office/drawing/2010/main" val="0"/>
+              </a:ext>
+            </a:extLst>
+          </a:blip>
+          <a:srcRect/>
+          <a:stretch>
+            <a:fillRect/>
+          </a:stretch>
+        </p:blipFill>
+        <p:spPr bwMode="auto">
+          <a:xfrm>
+            <a:off x="8180173" y="840312"/>
+            <a:ext cx="3761689" cy="2656694"/>
+          </a:xfrm>
+          <a:prstGeom prst="rect">
+            <a:avLst/>
+          </a:prstGeom>
+          <a:noFill/>
+          <a:extLst>
+            <a:ext uri="{909E8E84-426E-40DD-AFC4-6F175D3DCCD1}">
+              <a14:hiddenFill xmlns:a14="http://schemas.microsoft.com/office/drawing/2010/main">
+                <a:solidFill>
+                  <a:srgbClr val="FFFFFF"/>
+                </a:solidFill>
+              </a14:hiddenFill>
+            </a:ext>
+          </a:extLst>
+        </p:spPr>
+      </p:pic>
+    </p:spTree>
+    <p:extLst>
+      <p:ext uri="{BB962C8B-B14F-4D97-AF65-F5344CB8AC3E}">
+        <p14:creationId xmlns:p14="http://schemas.microsoft.com/office/powerpoint/2010/main" val="174647421"/>
       </p:ext>
     </p:extLst>
   </p:cSld>

</xml_diff>